<commit_message>
New scenes and updated presentation
</commit_message>
<xml_diff>
--- a/Presentation DS - drt.pptx
+++ b/Presentation DS - drt.pptx
@@ -5,7 +5,7 @@
     <p:sldMasterId id="2147483654" r:id="rId1"/>
   </p:sldMasterIdLst>
   <p:notesMasterIdLst>
-    <p:notesMasterId r:id="rId28"/>
+    <p:notesMasterId r:id="rId29"/>
   </p:notesMasterIdLst>
   <p:sldIdLst>
     <p:sldId id="256" r:id="rId2"/>
@@ -24,16 +24,17 @@
     <p:sldId id="276" r:id="rId15"/>
     <p:sldId id="287" r:id="rId16"/>
     <p:sldId id="268" r:id="rId17"/>
-    <p:sldId id="270" r:id="rId18"/>
-    <p:sldId id="272" r:id="rId19"/>
-    <p:sldId id="288" r:id="rId20"/>
-    <p:sldId id="263" r:id="rId21"/>
-    <p:sldId id="281" r:id="rId22"/>
-    <p:sldId id="267" r:id="rId23"/>
-    <p:sldId id="265" r:id="rId24"/>
-    <p:sldId id="278" r:id="rId25"/>
-    <p:sldId id="279" r:id="rId26"/>
-    <p:sldId id="280" r:id="rId27"/>
+    <p:sldId id="289" r:id="rId18"/>
+    <p:sldId id="270" r:id="rId19"/>
+    <p:sldId id="272" r:id="rId20"/>
+    <p:sldId id="288" r:id="rId21"/>
+    <p:sldId id="263" r:id="rId22"/>
+    <p:sldId id="281" r:id="rId23"/>
+    <p:sldId id="267" r:id="rId24"/>
+    <p:sldId id="265" r:id="rId25"/>
+    <p:sldId id="278" r:id="rId26"/>
+    <p:sldId id="279" r:id="rId27"/>
+    <p:sldId id="280" r:id="rId28"/>
   </p:sldIdLst>
   <p:sldSz cx="9144000" cy="5143500" type="screen16x9"/>
   <p:notesSz cx="6858000" cy="9144000"/>
@@ -1210,6 +1211,57 @@
           </a:bodyPr>
           <a:lstStyle/>
           <a:p>
+            <a:r>
+              <a:rPr lang="en-US" dirty="0" smtClean="0"/>
+              <a:t>Principe</a:t>
+            </a:r>
+            <a:r>
+              <a:rPr lang="en-US" baseline="0" dirty="0" smtClean="0"/>
+              <a:t> du </a:t>
+            </a:r>
+            <a:r>
+              <a:rPr lang="en-US" baseline="0" dirty="0" err="1" smtClean="0"/>
+              <a:t>renvoi</a:t>
+            </a:r>
+            <a:r>
+              <a:rPr lang="en-US" baseline="0" dirty="0" smtClean="0"/>
+              <a:t> de rayon, application de post-</a:t>
+            </a:r>
+            <a:r>
+              <a:rPr lang="en-US" baseline="0" dirty="0" err="1" smtClean="0"/>
+              <a:t>traitement</a:t>
+            </a:r>
+            <a:endParaRPr lang="en-US" baseline="0" dirty="0" smtClean="0"/>
+          </a:p>
+          <a:p>
+            <a:r>
+              <a:rPr lang="en-US" baseline="0" dirty="0" smtClean="0"/>
+              <a:t>Bastien =&gt;</a:t>
+            </a:r>
+            <a:r>
+              <a:rPr lang="en-US" baseline="0" dirty="0" err="1" smtClean="0"/>
+              <a:t>diaporama</a:t>
+            </a:r>
+            <a:r>
+              <a:rPr lang="en-US" baseline="0" dirty="0" smtClean="0"/>
+              <a:t> </a:t>
+            </a:r>
+            <a:r>
+              <a:rPr lang="en-US" baseline="0" dirty="0" err="1" smtClean="0"/>
+              <a:t>sur</a:t>
+            </a:r>
+            <a:r>
+              <a:rPr lang="en-US" baseline="0" dirty="0" smtClean="0"/>
+              <a:t> </a:t>
+            </a:r>
+            <a:r>
+              <a:rPr lang="en-US" baseline="0" dirty="0" err="1" smtClean="0"/>
+              <a:t>ecran</a:t>
+            </a:r>
+            <a:r>
+              <a:rPr lang="en-US" baseline="0" dirty="0" smtClean="0"/>
+              <a:t> 2</a:t>
+            </a:r>
             <a:endParaRPr dirty="0"/>
           </a:p>
         </p:txBody>
@@ -1418,7 +1470,13 @@
               <a:rPr lang="en-US" baseline="0" dirty="0" smtClean="0"/>
               <a:t> DE NEWTON !</a:t>
             </a:r>
-            <a:endParaRPr dirty="0"/>
+          </a:p>
+          <a:p>
+            <a:r>
+              <a:rPr lang="en-US" baseline="0" dirty="0" err="1" smtClean="0"/>
+              <a:t>Archi</a:t>
+            </a:r>
+            <a:endParaRPr lang="en-US" baseline="0" dirty="0" smtClean="0"/>
           </a:p>
         </p:txBody>
       </p:sp>
@@ -1436,6 +1494,153 @@
 </file>
 
 <file path=ppt/notesSlides/notesSlide17.xml><?xml version="1.0" encoding="utf-8"?>
+<p:notes xmlns:a="http://schemas.openxmlformats.org/drawingml/2006/main" xmlns:r="http://schemas.openxmlformats.org/officeDocument/2006/relationships" xmlns:p="http://schemas.openxmlformats.org/presentationml/2006/main">
+  <p:cSld>
+    <p:spTree>
+      <p:nvGrpSpPr>
+        <p:cNvPr id="1" name=""/>
+        <p:cNvGrpSpPr/>
+        <p:nvPr/>
+      </p:nvGrpSpPr>
+      <p:grpSpPr>
+        <a:xfrm>
+          <a:off x="0" y="0"/>
+          <a:ext cx="0" cy="0"/>
+          <a:chOff x="0" y="0"/>
+          <a:chExt cx="0" cy="0"/>
+        </a:xfrm>
+      </p:grpSpPr>
+      <p:sp>
+        <p:nvSpPr>
+          <p:cNvPr id="2" name="Slide Image Placeholder 1"/>
+          <p:cNvSpPr>
+            <a:spLocks noGrp="1" noRot="1" noChangeAspect="1"/>
+          </p:cNvSpPr>
+          <p:nvPr>
+            <p:ph type="sldImg"/>
+          </p:nvPr>
+        </p:nvSpPr>
+        <p:spPr/>
+      </p:sp>
+      <p:sp>
+        <p:nvSpPr>
+          <p:cNvPr id="3" name="Notes Placeholder 2"/>
+          <p:cNvSpPr>
+            <a:spLocks noGrp="1"/>
+          </p:cNvSpPr>
+          <p:nvPr>
+            <p:ph type="body" idx="1"/>
+          </p:nvPr>
+        </p:nvSpPr>
+        <p:spPr/>
+        <p:txBody>
+          <a:bodyPr/>
+          <a:lstStyle/>
+          <a:p>
+            <a:pPr marL="0" marR="0" indent="0" algn="l" defTabSz="914400" rtl="0" eaLnBrk="1" fontAlgn="auto" latinLnBrk="0" hangingPunct="1">
+              <a:lnSpc>
+                <a:spcPct val="100000"/>
+              </a:lnSpc>
+              <a:spcBef>
+                <a:spcPts val="0"/>
+              </a:spcBef>
+              <a:spcAft>
+                <a:spcPts val="0"/>
+              </a:spcAft>
+              <a:buClrTx/>
+              <a:buSzTx/>
+              <a:buFontTx/>
+              <a:buNone/>
+              <a:tabLst/>
+              <a:defRPr/>
+            </a:pPr>
+            <a:r>
+              <a:rPr lang="en-US" baseline="0" dirty="0" err="1" smtClean="0"/>
+              <a:t>Manip</a:t>
+            </a:r>
+            <a:r>
+              <a:rPr lang="en-US" baseline="0" dirty="0" smtClean="0"/>
+              <a:t> du client</a:t>
+            </a:r>
+          </a:p>
+          <a:p>
+            <a:pPr marL="0" marR="0" indent="0" algn="l" defTabSz="914400" rtl="0" eaLnBrk="1" fontAlgn="auto" latinLnBrk="0" hangingPunct="1">
+              <a:lnSpc>
+                <a:spcPct val="100000"/>
+              </a:lnSpc>
+              <a:spcBef>
+                <a:spcPts val="0"/>
+              </a:spcBef>
+              <a:spcAft>
+                <a:spcPts val="0"/>
+              </a:spcAft>
+              <a:buClrTx/>
+              <a:buSzTx/>
+              <a:buFontTx/>
+              <a:buNone/>
+              <a:tabLst/>
+              <a:defRPr/>
+            </a:pPr>
+            <a:r>
+              <a:rPr lang="en-US" baseline="0" dirty="0" smtClean="0"/>
+              <a:t>Notion de scene</a:t>
+            </a:r>
+          </a:p>
+          <a:p>
+            <a:pPr marL="0" marR="0" indent="0" algn="l" defTabSz="914400" rtl="0" eaLnBrk="1" fontAlgn="auto" latinLnBrk="0" hangingPunct="1">
+              <a:lnSpc>
+                <a:spcPct val="100000"/>
+              </a:lnSpc>
+              <a:spcBef>
+                <a:spcPts val="0"/>
+              </a:spcBef>
+              <a:spcAft>
+                <a:spcPts val="0"/>
+              </a:spcAft>
+              <a:buClrTx/>
+              <a:buSzTx/>
+              <a:buFontTx/>
+              <a:buNone/>
+              <a:tabLst/>
+              <a:defRPr/>
+            </a:pPr>
+            <a:r>
+              <a:rPr lang="en-US" baseline="0" dirty="0" smtClean="0"/>
+              <a:t>Scene </a:t>
+            </a:r>
+            <a:r>
+              <a:rPr lang="en-US" baseline="0" dirty="0" err="1" smtClean="0"/>
+              <a:t>depuis</a:t>
+            </a:r>
+            <a:r>
+              <a:rPr lang="en-US" baseline="0" dirty="0" smtClean="0"/>
+              <a:t> save (</a:t>
+            </a:r>
+            <a:r>
+              <a:rPr lang="en-US" baseline="0" dirty="0" err="1" smtClean="0"/>
+              <a:t>pokemon</a:t>
+            </a:r>
+            <a:r>
+              <a:rPr lang="en-US" baseline="0" dirty="0" smtClean="0"/>
+              <a:t>)</a:t>
+            </a:r>
+          </a:p>
+        </p:txBody>
+      </p:sp>
+    </p:spTree>
+    <p:extLst>
+      <p:ext uri="{BB962C8B-B14F-4D97-AF65-F5344CB8AC3E}">
+        <p14:creationId xmlns:p14="http://schemas.microsoft.com/office/powerpoint/2010/main" val="933422179"/>
+      </p:ext>
+    </p:extLst>
+  </p:cSld>
+  <p:clrMapOvr>
+    <a:masterClrMapping/>
+  </p:clrMapOvr>
+</p:notes>
+</file>
+
+<file path=ppt/notesSlides/notesSlide18.xml><?xml version="1.0" encoding="utf-8"?>
 <p:notes xmlns:a="http://schemas.openxmlformats.org/drawingml/2006/main" xmlns:r="http://schemas.openxmlformats.org/officeDocument/2006/relationships" xmlns:p="http://schemas.openxmlformats.org/presentationml/2006/main" showMasterSp="0" showMasterPhAnim="0">
   <p:cSld>
     <p:spTree>
@@ -1518,7 +1723,11 @@
           </a:bodyPr>
           <a:lstStyle/>
           <a:p>
-            <a:endParaRPr/>
+            <a:r>
+              <a:rPr lang="en-US" dirty="0" smtClean="0"/>
+              <a:t>Server mapping</a:t>
+            </a:r>
+            <a:endParaRPr dirty="0"/>
           </a:p>
         </p:txBody>
       </p:sp>
@@ -1535,7 +1744,7 @@
 </p:notes>
 </file>
 
-<file path=ppt/notesSlides/notesSlide18.xml><?xml version="1.0" encoding="utf-8"?>
+<file path=ppt/notesSlides/notesSlide19.xml><?xml version="1.0" encoding="utf-8"?>
 <p:notes xmlns:a="http://schemas.openxmlformats.org/drawingml/2006/main" xmlns:r="http://schemas.openxmlformats.org/officeDocument/2006/relationships" xmlns:p="http://schemas.openxmlformats.org/presentationml/2006/main" showMasterSp="0" showMasterPhAnim="0">
   <p:cSld>
     <p:spTree>
@@ -1618,7 +1827,21 @@
           </a:bodyPr>
           <a:lstStyle/>
           <a:p>
-            <a:endParaRPr/>
+            <a:r>
+              <a:rPr lang="en-US" dirty="0" err="1" smtClean="0"/>
+              <a:t>Berceau</a:t>
+            </a:r>
+            <a:r>
+              <a:rPr lang="en-US" dirty="0" smtClean="0"/>
+              <a:t> de newton =&gt; end ?</a:t>
+            </a:r>
+          </a:p>
+          <a:p>
+            <a:r>
+              <a:rPr lang="en-US" dirty="0" smtClean="0"/>
+              <a:t>Umbrella</a:t>
+            </a:r>
+            <a:endParaRPr dirty="0"/>
           </a:p>
         </p:txBody>
       </p:sp>
@@ -1626,106 +1849,6 @@
     <p:extLst>
       <p:ext uri="{BB962C8B-B14F-4D97-AF65-F5344CB8AC3E}">
         <p14:creationId xmlns:p14="http://schemas.microsoft.com/office/powerpoint/2010/main" val="714751750"/>
-      </p:ext>
-    </p:extLst>
-  </p:cSld>
-  <p:clrMapOvr>
-    <a:masterClrMapping/>
-  </p:clrMapOvr>
-</p:notes>
-</file>
-
-<file path=ppt/notesSlides/notesSlide19.xml><?xml version="1.0" encoding="utf-8"?>
-<p:notes xmlns:a="http://schemas.openxmlformats.org/drawingml/2006/main" xmlns:r="http://schemas.openxmlformats.org/officeDocument/2006/relationships" xmlns:p="http://schemas.openxmlformats.org/presentationml/2006/main" showMasterSp="0" showMasterPhAnim="0">
-  <p:cSld>
-    <p:spTree>
-      <p:nvGrpSpPr>
-        <p:cNvPr id="1" name="Shape 54"/>
-        <p:cNvGrpSpPr/>
-        <p:nvPr/>
-      </p:nvGrpSpPr>
-      <p:grpSpPr>
-        <a:xfrm>
-          <a:off x="0" y="0"/>
-          <a:ext cx="0" cy="0"/>
-          <a:chOff x="0" y="0"/>
-          <a:chExt cx="0" cy="0"/>
-        </a:xfrm>
-      </p:grpSpPr>
-      <p:sp>
-        <p:nvSpPr>
-          <p:cNvPr id="55" name="Shape 55"/>
-          <p:cNvSpPr>
-            <a:spLocks noGrp="1" noRot="1" noChangeAspect="1"/>
-          </p:cNvSpPr>
-          <p:nvPr>
-            <p:ph type="sldImg" idx="2"/>
-          </p:nvPr>
-        </p:nvSpPr>
-        <p:spPr>
-          <a:xfrm>
-            <a:off x="381000" y="685800"/>
-            <a:ext cx="6096000" cy="3429000"/>
-          </a:xfrm>
-          <a:custGeom>
-            <a:avLst/>
-            <a:gdLst/>
-            <a:ahLst/>
-            <a:cxnLst/>
-            <a:rect l="0" t="0" r="0" b="0"/>
-            <a:pathLst>
-              <a:path w="120000" h="120000" extrusionOk="0">
-                <a:moveTo>
-                  <a:pt x="0" y="0"/>
-                </a:moveTo>
-                <a:lnTo>
-                  <a:pt x="120000" y="0"/>
-                </a:lnTo>
-                <a:lnTo>
-                  <a:pt x="120000" y="120000"/>
-                </a:lnTo>
-                <a:lnTo>
-                  <a:pt x="0" y="120000"/>
-                </a:lnTo>
-                <a:close/>
-              </a:path>
-            </a:pathLst>
-          </a:custGeom>
-        </p:spPr>
-      </p:sp>
-      <p:sp>
-        <p:nvSpPr>
-          <p:cNvPr id="56" name="Shape 56"/>
-          <p:cNvSpPr txBox="1">
-            <a:spLocks noGrp="1"/>
-          </p:cNvSpPr>
-          <p:nvPr>
-            <p:ph type="body" idx="1"/>
-          </p:nvPr>
-        </p:nvSpPr>
-        <p:spPr>
-          <a:xfrm>
-            <a:off x="685800" y="4343400"/>
-            <a:ext cx="5486399" cy="4114800"/>
-          </a:xfrm>
-          <a:prstGeom prst="rect">
-            <a:avLst/>
-          </a:prstGeom>
-        </p:spPr>
-        <p:txBody>
-          <a:bodyPr lIns="91425" tIns="91425" rIns="91425" bIns="91425" anchor="t" anchorCtr="0">
-            <a:noAutofit/>
-          </a:bodyPr>
-          <a:lstStyle/>
-          <a:p>
-            <a:endParaRPr dirty="0"/>
-          </a:p>
-        </p:txBody>
-      </p:sp>
-    </p:spTree>
-    <p:extLst>
-      <p:ext uri="{BB962C8B-B14F-4D97-AF65-F5344CB8AC3E}">
-        <p14:creationId xmlns:p14="http://schemas.microsoft.com/office/powerpoint/2010/main" val="1888195084"/>
       </p:ext>
     </p:extLst>
   </p:cSld>
@@ -1889,7 +2012,7 @@
   <p:cSld>
     <p:spTree>
       <p:nvGrpSpPr>
-        <p:cNvPr id="1" name="Shape 143"/>
+        <p:cNvPr id="1" name="Shape 54"/>
         <p:cNvGrpSpPr/>
         <p:nvPr/>
       </p:nvGrpSpPr>
@@ -1903,7 +2026,7 @@
       </p:grpSpPr>
       <p:sp>
         <p:nvSpPr>
-          <p:cNvPr id="144" name="Shape 144"/>
+          <p:cNvPr id="55" name="Shape 55"/>
           <p:cNvSpPr>
             <a:spLocks noGrp="1" noRot="1" noChangeAspect="1"/>
           </p:cNvSpPr>
@@ -1944,7 +2067,7 @@
       </p:sp>
       <p:sp>
         <p:nvSpPr>
-          <p:cNvPr id="145" name="Shape 145"/>
+          <p:cNvPr id="56" name="Shape 56"/>
           <p:cNvSpPr txBox="1">
             <a:spLocks noGrp="1"/>
           </p:cNvSpPr>
@@ -1967,14 +2090,14 @@
           </a:bodyPr>
           <a:lstStyle/>
           <a:p>
-            <a:endParaRPr/>
+            <a:endParaRPr dirty="0"/>
           </a:p>
         </p:txBody>
       </p:sp>
     </p:spTree>
     <p:extLst>
       <p:ext uri="{BB962C8B-B14F-4D97-AF65-F5344CB8AC3E}">
-        <p14:creationId xmlns:p14="http://schemas.microsoft.com/office/powerpoint/2010/main" val="2985260490"/>
+        <p14:creationId xmlns:p14="http://schemas.microsoft.com/office/powerpoint/2010/main" val="1888195084"/>
       </p:ext>
     </p:extLst>
   </p:cSld>
@@ -1985,11 +2108,11 @@
 </file>
 
 <file path=ppt/notesSlides/notesSlide21.xml><?xml version="1.0" encoding="utf-8"?>
-<p:notes xmlns:a="http://schemas.openxmlformats.org/drawingml/2006/main" xmlns:r="http://schemas.openxmlformats.org/officeDocument/2006/relationships" xmlns:p="http://schemas.openxmlformats.org/presentationml/2006/main">
+<p:notes xmlns:a="http://schemas.openxmlformats.org/drawingml/2006/main" xmlns:r="http://schemas.openxmlformats.org/officeDocument/2006/relationships" xmlns:p="http://schemas.openxmlformats.org/presentationml/2006/main" showMasterSp="0" showMasterPhAnim="0">
   <p:cSld>
     <p:spTree>
       <p:nvGrpSpPr>
-        <p:cNvPr id="1" name=""/>
+        <p:cNvPr id="1" name="Shape 143"/>
         <p:cNvGrpSpPr/>
         <p:nvPr/>
       </p:nvGrpSpPr>
@@ -2003,77 +2126,7 @@
       </p:grpSpPr>
       <p:sp>
         <p:nvSpPr>
-          <p:cNvPr id="2" name="Slide Image Placeholder 1"/>
-          <p:cNvSpPr>
-            <a:spLocks noGrp="1" noRot="1" noChangeAspect="1"/>
-          </p:cNvSpPr>
-          <p:nvPr>
-            <p:ph type="sldImg"/>
-          </p:nvPr>
-        </p:nvSpPr>
-        <p:spPr>
-          <a:xfrm>
-            <a:off x="381000" y="685800"/>
-            <a:ext cx="6096000" cy="3429000"/>
-          </a:xfrm>
-        </p:spPr>
-      </p:sp>
-      <p:sp>
-        <p:nvSpPr>
-          <p:cNvPr id="3" name="Notes Placeholder 2"/>
-          <p:cNvSpPr>
-            <a:spLocks noGrp="1"/>
-          </p:cNvSpPr>
-          <p:nvPr>
-            <p:ph type="body" idx="1"/>
-          </p:nvPr>
-        </p:nvSpPr>
-        <p:spPr/>
-        <p:txBody>
-          <a:bodyPr/>
-          <a:lstStyle/>
-          <a:p>
-            <a:r>
-              <a:rPr lang="en-US" dirty="0" smtClean="0"/>
-              <a:t>Definition FJF</a:t>
-            </a:r>
-            <a:endParaRPr lang="fr-FR" dirty="0"/>
-          </a:p>
-        </p:txBody>
-      </p:sp>
-    </p:spTree>
-    <p:extLst>
-      <p:ext uri="{BB962C8B-B14F-4D97-AF65-F5344CB8AC3E}">
-        <p14:creationId xmlns:p14="http://schemas.microsoft.com/office/powerpoint/2010/main" val="3063469759"/>
-      </p:ext>
-    </p:extLst>
-  </p:cSld>
-  <p:clrMapOvr>
-    <a:masterClrMapping/>
-  </p:clrMapOvr>
-</p:notes>
-</file>
-
-<file path=ppt/notesSlides/notesSlide22.xml><?xml version="1.0" encoding="utf-8"?>
-<p:notes xmlns:a="http://schemas.openxmlformats.org/drawingml/2006/main" xmlns:r="http://schemas.openxmlformats.org/officeDocument/2006/relationships" xmlns:p="http://schemas.openxmlformats.org/presentationml/2006/main" showMasterSp="0" showMasterPhAnim="0">
-  <p:cSld>
-    <p:spTree>
-      <p:nvGrpSpPr>
-        <p:cNvPr id="1" name="Shape 193"/>
-        <p:cNvGrpSpPr/>
-        <p:nvPr/>
-      </p:nvGrpSpPr>
-      <p:grpSpPr>
-        <a:xfrm>
-          <a:off x="0" y="0"/>
-          <a:ext cx="0" cy="0"/>
-          <a:chOff x="0" y="0"/>
-          <a:chExt cx="0" cy="0"/>
-        </a:xfrm>
-      </p:grpSpPr>
-      <p:sp>
-        <p:nvSpPr>
-          <p:cNvPr id="194" name="Shape 194"/>
+          <p:cNvPr id="144" name="Shape 144"/>
           <p:cNvSpPr>
             <a:spLocks noGrp="1" noRot="1" noChangeAspect="1"/>
           </p:cNvSpPr>
@@ -2114,7 +2167,7 @@
       </p:sp>
       <p:sp>
         <p:nvSpPr>
-          <p:cNvPr id="195" name="Shape 195"/>
+          <p:cNvPr id="145" name="Shape 145"/>
           <p:cNvSpPr txBox="1">
             <a:spLocks noGrp="1"/>
           </p:cNvSpPr>
@@ -2137,51 +2190,84 @@
           </a:bodyPr>
           <a:lstStyle/>
           <a:p>
-            <a:r>
-              <a:rPr lang="en-US" dirty="0" smtClean="0"/>
-              <a:t>Definition</a:t>
-            </a:r>
-            <a:r>
-              <a:rPr lang="en-US" baseline="0" dirty="0" smtClean="0"/>
-              <a:t> Thread</a:t>
-            </a:r>
-            <a:endParaRPr lang="en-US" dirty="0" smtClean="0"/>
-          </a:p>
-          <a:p>
-            <a:endParaRPr lang="en-US" dirty="0" smtClean="0"/>
-          </a:p>
-          <a:p>
-            <a:r>
-              <a:rPr lang="en-US" dirty="0" smtClean="0"/>
-              <a:t>Worker manager -&gt; event bus</a:t>
-            </a:r>
-          </a:p>
-          <a:p>
-            <a:r>
-              <a:rPr lang="en-US" dirty="0" smtClean="0"/>
-              <a:t>(architecture event)</a:t>
-            </a:r>
-          </a:p>
-          <a:p>
-            <a:endParaRPr lang="en-US" dirty="0" smtClean="0"/>
-          </a:p>
-          <a:p>
-            <a:r>
-              <a:rPr lang="en-US" dirty="0" smtClean="0"/>
-              <a:t>For calculus,</a:t>
-            </a:r>
-            <a:r>
-              <a:rPr lang="en-US" baseline="0" dirty="0" smtClean="0"/>
-              <a:t> =&gt; next slide</a:t>
-            </a:r>
-            <a:endParaRPr dirty="0"/>
+            <a:endParaRPr/>
           </a:p>
         </p:txBody>
       </p:sp>
     </p:spTree>
     <p:extLst>
       <p:ext uri="{BB962C8B-B14F-4D97-AF65-F5344CB8AC3E}">
-        <p14:creationId xmlns:p14="http://schemas.microsoft.com/office/powerpoint/2010/main" val="1033013205"/>
+        <p14:creationId xmlns:p14="http://schemas.microsoft.com/office/powerpoint/2010/main" val="2985260490"/>
+      </p:ext>
+    </p:extLst>
+  </p:cSld>
+  <p:clrMapOvr>
+    <a:masterClrMapping/>
+  </p:clrMapOvr>
+</p:notes>
+</file>
+
+<file path=ppt/notesSlides/notesSlide22.xml><?xml version="1.0" encoding="utf-8"?>
+<p:notes xmlns:a="http://schemas.openxmlformats.org/drawingml/2006/main" xmlns:r="http://schemas.openxmlformats.org/officeDocument/2006/relationships" xmlns:p="http://schemas.openxmlformats.org/presentationml/2006/main">
+  <p:cSld>
+    <p:spTree>
+      <p:nvGrpSpPr>
+        <p:cNvPr id="1" name=""/>
+        <p:cNvGrpSpPr/>
+        <p:nvPr/>
+      </p:nvGrpSpPr>
+      <p:grpSpPr>
+        <a:xfrm>
+          <a:off x="0" y="0"/>
+          <a:ext cx="0" cy="0"/>
+          <a:chOff x="0" y="0"/>
+          <a:chExt cx="0" cy="0"/>
+        </a:xfrm>
+      </p:grpSpPr>
+      <p:sp>
+        <p:nvSpPr>
+          <p:cNvPr id="2" name="Slide Image Placeholder 1"/>
+          <p:cNvSpPr>
+            <a:spLocks noGrp="1" noRot="1" noChangeAspect="1"/>
+          </p:cNvSpPr>
+          <p:nvPr>
+            <p:ph type="sldImg"/>
+          </p:nvPr>
+        </p:nvSpPr>
+        <p:spPr>
+          <a:xfrm>
+            <a:off x="381000" y="685800"/>
+            <a:ext cx="6096000" cy="3429000"/>
+          </a:xfrm>
+        </p:spPr>
+      </p:sp>
+      <p:sp>
+        <p:nvSpPr>
+          <p:cNvPr id="3" name="Notes Placeholder 2"/>
+          <p:cNvSpPr>
+            <a:spLocks noGrp="1"/>
+          </p:cNvSpPr>
+          <p:nvPr>
+            <p:ph type="body" idx="1"/>
+          </p:nvPr>
+        </p:nvSpPr>
+        <p:spPr/>
+        <p:txBody>
+          <a:bodyPr/>
+          <a:lstStyle/>
+          <a:p>
+            <a:r>
+              <a:rPr lang="en-US" dirty="0" smtClean="0"/>
+              <a:t>Definition FJF</a:t>
+            </a:r>
+            <a:endParaRPr lang="fr-FR" dirty="0"/>
+          </a:p>
+        </p:txBody>
+      </p:sp>
+    </p:spTree>
+    <p:extLst>
+      <p:ext uri="{BB962C8B-B14F-4D97-AF65-F5344CB8AC3E}">
+        <p14:creationId xmlns:p14="http://schemas.microsoft.com/office/powerpoint/2010/main" val="3063469759"/>
       </p:ext>
     </p:extLst>
   </p:cSld>
@@ -2196,7 +2282,7 @@
   <p:cSld>
     <p:spTree>
       <p:nvGrpSpPr>
-        <p:cNvPr id="1" name="Shape 168"/>
+        <p:cNvPr id="1" name="Shape 193"/>
         <p:cNvGrpSpPr/>
         <p:nvPr/>
       </p:nvGrpSpPr>
@@ -2210,7 +2296,7 @@
       </p:grpSpPr>
       <p:sp>
         <p:nvSpPr>
-          <p:cNvPr id="169" name="Shape 169"/>
+          <p:cNvPr id="194" name="Shape 194"/>
           <p:cNvSpPr>
             <a:spLocks noGrp="1" noRot="1" noChangeAspect="1"/>
           </p:cNvSpPr>
@@ -2251,7 +2337,7 @@
       </p:sp>
       <p:sp>
         <p:nvSpPr>
-          <p:cNvPr id="170" name="Shape 170"/>
+          <p:cNvPr id="195" name="Shape 195"/>
           <p:cNvSpPr txBox="1">
             <a:spLocks noGrp="1"/>
           </p:cNvSpPr>
@@ -2276,11 +2362,40 @@
           <a:p>
             <a:r>
               <a:rPr lang="en-US" dirty="0" smtClean="0"/>
-              <a:t>After calculus,</a:t>
+              <a:t>Definition</a:t>
             </a:r>
             <a:r>
               <a:rPr lang="en-US" baseline="0" dirty="0" smtClean="0"/>
-              <a:t> send all colors to clients in a row</a:t>
+              <a:t> Thread</a:t>
+            </a:r>
+            <a:endParaRPr lang="en-US" dirty="0" smtClean="0"/>
+          </a:p>
+          <a:p>
+            <a:endParaRPr lang="en-US" dirty="0" smtClean="0"/>
+          </a:p>
+          <a:p>
+            <a:r>
+              <a:rPr lang="en-US" dirty="0" smtClean="0"/>
+              <a:t>Worker manager -&gt; event bus</a:t>
+            </a:r>
+          </a:p>
+          <a:p>
+            <a:r>
+              <a:rPr lang="en-US" dirty="0" smtClean="0"/>
+              <a:t>(architecture event)</a:t>
+            </a:r>
+          </a:p>
+          <a:p>
+            <a:endParaRPr lang="en-US" dirty="0" smtClean="0"/>
+          </a:p>
+          <a:p>
+            <a:r>
+              <a:rPr lang="en-US" dirty="0" smtClean="0"/>
+              <a:t>For calculus,</a:t>
+            </a:r>
+            <a:r>
+              <a:rPr lang="en-US" baseline="0" dirty="0" smtClean="0"/>
+              <a:t> =&gt; next slide</a:t>
             </a:r>
             <a:endParaRPr dirty="0"/>
           </a:p>
@@ -2289,7 +2404,7 @@
     </p:spTree>
     <p:extLst>
       <p:ext uri="{BB962C8B-B14F-4D97-AF65-F5344CB8AC3E}">
-        <p14:creationId xmlns:p14="http://schemas.microsoft.com/office/powerpoint/2010/main" val="1253420605"/>
+        <p14:creationId xmlns:p14="http://schemas.microsoft.com/office/powerpoint/2010/main" val="1033013205"/>
       </p:ext>
     </p:extLst>
   </p:cSld>
@@ -2304,7 +2419,7 @@
   <p:cSld>
     <p:spTree>
       <p:nvGrpSpPr>
-        <p:cNvPr id="1" name="Shape 342"/>
+        <p:cNvPr id="1" name="Shape 168"/>
         <p:cNvGrpSpPr/>
         <p:nvPr/>
       </p:nvGrpSpPr>
@@ -2318,7 +2433,7 @@
       </p:grpSpPr>
       <p:sp>
         <p:nvSpPr>
-          <p:cNvPr id="343" name="Shape 343"/>
+          <p:cNvPr id="169" name="Shape 169"/>
           <p:cNvSpPr>
             <a:spLocks noGrp="1" noRot="1" noChangeAspect="1"/>
           </p:cNvSpPr>
@@ -2328,8 +2443,8 @@
         </p:nvSpPr>
         <p:spPr>
           <a:xfrm>
-            <a:off x="381187" y="685800"/>
-            <a:ext cx="6096299" cy="3429000"/>
+            <a:off x="381000" y="685800"/>
+            <a:ext cx="6096000" cy="3429000"/>
           </a:xfrm>
           <a:custGeom>
             <a:avLst/>
@@ -2359,7 +2474,7 @@
       </p:sp>
       <p:sp>
         <p:nvSpPr>
-          <p:cNvPr id="344" name="Shape 344"/>
+          <p:cNvPr id="170" name="Shape 170"/>
           <p:cNvSpPr txBox="1">
             <a:spLocks noGrp="1"/>
           </p:cNvSpPr>
@@ -2384,15 +2499,11 @@
           <a:p>
             <a:r>
               <a:rPr lang="en-US" dirty="0" smtClean="0"/>
-              <a:t>Navigation</a:t>
+              <a:t>After calculus,</a:t>
             </a:r>
             <a:r>
               <a:rPr lang="en-US" baseline="0" dirty="0" smtClean="0"/>
-              <a:t> pour exposer des gif / </a:t>
-            </a:r>
-            <a:r>
-              <a:rPr lang="en-US" baseline="0" dirty="0" err="1" smtClean="0"/>
-              <a:t>rendus</a:t>
+              <a:t> send all colors to clients in a row</a:t>
             </a:r>
             <a:endParaRPr dirty="0"/>
           </a:p>
@@ -2401,7 +2512,7 @@
     </p:spTree>
     <p:extLst>
       <p:ext uri="{BB962C8B-B14F-4D97-AF65-F5344CB8AC3E}">
-        <p14:creationId xmlns:p14="http://schemas.microsoft.com/office/powerpoint/2010/main" val="225962873"/>
+        <p14:creationId xmlns:p14="http://schemas.microsoft.com/office/powerpoint/2010/main" val="1253420605"/>
       </p:ext>
     </p:extLst>
   </p:cSld>
@@ -2416,7 +2527,7 @@
   <p:cSld>
     <p:spTree>
       <p:nvGrpSpPr>
-        <p:cNvPr id="1" name="Shape 348"/>
+        <p:cNvPr id="1" name="Shape 342"/>
         <p:cNvGrpSpPr/>
         <p:nvPr/>
       </p:nvGrpSpPr>
@@ -2430,7 +2541,7 @@
       </p:grpSpPr>
       <p:sp>
         <p:nvSpPr>
-          <p:cNvPr id="349" name="Shape 349"/>
+          <p:cNvPr id="343" name="Shape 343"/>
           <p:cNvSpPr>
             <a:spLocks noGrp="1" noRot="1" noChangeAspect="1"/>
           </p:cNvSpPr>
@@ -2471,6 +2582,118 @@
       </p:sp>
       <p:sp>
         <p:nvSpPr>
+          <p:cNvPr id="344" name="Shape 344"/>
+          <p:cNvSpPr txBox="1">
+            <a:spLocks noGrp="1"/>
+          </p:cNvSpPr>
+          <p:nvPr>
+            <p:ph type="body" idx="1"/>
+          </p:nvPr>
+        </p:nvSpPr>
+        <p:spPr>
+          <a:xfrm>
+            <a:off x="685800" y="4343400"/>
+            <a:ext cx="5486399" cy="4114800"/>
+          </a:xfrm>
+          <a:prstGeom prst="rect">
+            <a:avLst/>
+          </a:prstGeom>
+        </p:spPr>
+        <p:txBody>
+          <a:bodyPr lIns="91425" tIns="91425" rIns="91425" bIns="91425" anchor="t" anchorCtr="0">
+            <a:noAutofit/>
+          </a:bodyPr>
+          <a:lstStyle/>
+          <a:p>
+            <a:r>
+              <a:rPr lang="en-US" dirty="0" smtClean="0"/>
+              <a:t>Navigation</a:t>
+            </a:r>
+            <a:r>
+              <a:rPr lang="en-US" baseline="0" dirty="0" smtClean="0"/>
+              <a:t> pour exposer des gif / </a:t>
+            </a:r>
+            <a:r>
+              <a:rPr lang="en-US" baseline="0" dirty="0" err="1" smtClean="0"/>
+              <a:t>rendus</a:t>
+            </a:r>
+            <a:endParaRPr dirty="0"/>
+          </a:p>
+        </p:txBody>
+      </p:sp>
+    </p:spTree>
+    <p:extLst>
+      <p:ext uri="{BB962C8B-B14F-4D97-AF65-F5344CB8AC3E}">
+        <p14:creationId xmlns:p14="http://schemas.microsoft.com/office/powerpoint/2010/main" val="225962873"/>
+      </p:ext>
+    </p:extLst>
+  </p:cSld>
+  <p:clrMapOvr>
+    <a:masterClrMapping/>
+  </p:clrMapOvr>
+</p:notes>
+</file>
+
+<file path=ppt/notesSlides/notesSlide26.xml><?xml version="1.0" encoding="utf-8"?>
+<p:notes xmlns:a="http://schemas.openxmlformats.org/drawingml/2006/main" xmlns:r="http://schemas.openxmlformats.org/officeDocument/2006/relationships" xmlns:p="http://schemas.openxmlformats.org/presentationml/2006/main" showMasterSp="0" showMasterPhAnim="0">
+  <p:cSld>
+    <p:spTree>
+      <p:nvGrpSpPr>
+        <p:cNvPr id="1" name="Shape 348"/>
+        <p:cNvGrpSpPr/>
+        <p:nvPr/>
+      </p:nvGrpSpPr>
+      <p:grpSpPr>
+        <a:xfrm>
+          <a:off x="0" y="0"/>
+          <a:ext cx="0" cy="0"/>
+          <a:chOff x="0" y="0"/>
+          <a:chExt cx="0" cy="0"/>
+        </a:xfrm>
+      </p:grpSpPr>
+      <p:sp>
+        <p:nvSpPr>
+          <p:cNvPr id="349" name="Shape 349"/>
+          <p:cNvSpPr>
+            <a:spLocks noGrp="1" noRot="1" noChangeAspect="1"/>
+          </p:cNvSpPr>
+          <p:nvPr>
+            <p:ph type="sldImg" idx="2"/>
+          </p:nvPr>
+        </p:nvSpPr>
+        <p:spPr>
+          <a:xfrm>
+            <a:off x="381187" y="685800"/>
+            <a:ext cx="6096299" cy="3429000"/>
+          </a:xfrm>
+          <a:custGeom>
+            <a:avLst/>
+            <a:gdLst/>
+            <a:ahLst/>
+            <a:cxnLst/>
+            <a:rect l="0" t="0" r="0" b="0"/>
+            <a:pathLst>
+              <a:path w="120000" h="120000" extrusionOk="0">
+                <a:moveTo>
+                  <a:pt x="0" y="0"/>
+                </a:moveTo>
+                <a:lnTo>
+                  <a:pt x="120000" y="0"/>
+                </a:lnTo>
+                <a:lnTo>
+                  <a:pt x="120000" y="120000"/>
+                </a:lnTo>
+                <a:lnTo>
+                  <a:pt x="0" y="120000"/>
+                </a:lnTo>
+                <a:close/>
+              </a:path>
+            </a:pathLst>
+          </a:custGeom>
+        </p:spPr>
+      </p:sp>
+      <p:sp>
+        <p:nvSpPr>
           <p:cNvPr id="350" name="Shape 350"/>
           <p:cNvSpPr txBox="1">
             <a:spLocks noGrp="1"/>
@@ -2511,7 +2734,7 @@
 </p:notes>
 </file>
 
-<file path=ppt/notesSlides/notesSlide26.xml><?xml version="1.0" encoding="utf-8"?>
+<file path=ppt/notesSlides/notesSlide27.xml><?xml version="1.0" encoding="utf-8"?>
 <p:notes xmlns:a="http://schemas.openxmlformats.org/drawingml/2006/main" xmlns:r="http://schemas.openxmlformats.org/officeDocument/2006/relationships" xmlns:p="http://schemas.openxmlformats.org/presentationml/2006/main" showMasterSp="0" showMasterPhAnim="0">
   <p:cSld>
     <p:spTree>
@@ -3001,8 +3224,8 @@
         </p:nvSpPr>
         <p:spPr>
           <a:xfrm>
-            <a:off x="381187" y="685800"/>
-            <a:ext cx="6096299" cy="3429000"/>
+            <a:off x="381000" y="685800"/>
+            <a:ext cx="6096000" cy="3429000"/>
           </a:xfrm>
           <a:custGeom>
             <a:avLst/>
@@ -8589,6 +8812,66 @@
   <p:cSld>
     <p:spTree>
       <p:nvGrpSpPr>
+        <p:cNvPr id="1" name=""/>
+        <p:cNvGrpSpPr/>
+        <p:nvPr/>
+      </p:nvGrpSpPr>
+      <p:grpSpPr>
+        <a:xfrm>
+          <a:off x="0" y="0"/>
+          <a:ext cx="0" cy="0"/>
+          <a:chOff x="0" y="0"/>
+          <a:chExt cx="0" cy="0"/>
+        </a:xfrm>
+      </p:grpSpPr>
+      <p:sp>
+        <p:nvSpPr>
+          <p:cNvPr id="5" name="Title 4"/>
+          <p:cNvSpPr>
+            <a:spLocks noGrp="1"/>
+          </p:cNvSpPr>
+          <p:nvPr>
+            <p:ph type="ctrTitle"/>
+          </p:nvPr>
+        </p:nvSpPr>
+        <p:spPr/>
+        <p:txBody>
+          <a:bodyPr/>
+          <a:lstStyle/>
+          <a:p>
+            <a:r>
+              <a:rPr lang="en-US" dirty="0" smtClean="0"/>
+              <a:t>The client in action</a:t>
+            </a:r>
+            <a:endParaRPr lang="fr-FR" dirty="0"/>
+          </a:p>
+        </p:txBody>
+      </p:sp>
+    </p:spTree>
+    <p:extLst>
+      <p:ext uri="{BB962C8B-B14F-4D97-AF65-F5344CB8AC3E}">
+        <p14:creationId xmlns:p14="http://schemas.microsoft.com/office/powerpoint/2010/main" val="1918854796"/>
+      </p:ext>
+    </p:extLst>
+  </p:cSld>
+  <p:clrMapOvr>
+    <a:masterClrMapping/>
+  </p:clrMapOvr>
+  <p:timing>
+    <p:tnLst>
+      <p:par>
+        <p:cTn id="1" dur="indefinite" restart="never" nodeType="tmRoot"/>
+      </p:par>
+    </p:tnLst>
+  </p:timing>
+</p:sld>
+</file>
+
+<file path=ppt/slides/slide18.xml><?xml version="1.0" encoding="utf-8"?>
+<p:sld xmlns:a="http://schemas.openxmlformats.org/drawingml/2006/main" xmlns:r="http://schemas.openxmlformats.org/officeDocument/2006/relationships" xmlns:p="http://schemas.openxmlformats.org/presentationml/2006/main">
+  <p:cSld>
+    <p:spTree>
+      <p:nvGrpSpPr>
         <p:cNvPr id="1" name="Shape 223"/>
         <p:cNvGrpSpPr/>
         <p:nvPr/>
@@ -8897,7 +9180,7 @@
 </p:sld>
 </file>
 
-<file path=ppt/slides/slide18.xml><?xml version="1.0" encoding="utf-8"?>
+<file path=ppt/slides/slide19.xml><?xml version="1.0" encoding="utf-8"?>
 <p:sld xmlns:a="http://schemas.openxmlformats.org/drawingml/2006/main" xmlns:r="http://schemas.openxmlformats.org/officeDocument/2006/relationships" xmlns:p="http://schemas.openxmlformats.org/presentationml/2006/main">
   <p:cSld>
     <p:spTree>
@@ -9029,125 +9312,6 @@
         </p:txBody>
       </p:sp>
     </p:spTree>
-  </p:cSld>
-  <p:clrMapOvr>
-    <a:masterClrMapping/>
-  </p:clrMapOvr>
-  <p:transition spd="slow">
-    <p:cut/>
-  </p:transition>
-  <p:timing>
-    <p:tnLst>
-      <p:par>
-        <p:cTn id="1" dur="indefinite" restart="never" nodeType="tmRoot"/>
-      </p:par>
-    </p:tnLst>
-  </p:timing>
-</p:sld>
-</file>
-
-<file path=ppt/slides/slide19.xml><?xml version="1.0" encoding="utf-8"?>
-<p:sld xmlns:a="http://schemas.openxmlformats.org/drawingml/2006/main" xmlns:r="http://schemas.openxmlformats.org/officeDocument/2006/relationships" xmlns:p="http://schemas.openxmlformats.org/presentationml/2006/main">
-  <p:cSld>
-    <p:spTree>
-      <p:nvGrpSpPr>
-        <p:cNvPr id="1" name="Shape 51"/>
-        <p:cNvGrpSpPr/>
-        <p:nvPr/>
-      </p:nvGrpSpPr>
-      <p:grpSpPr>
-        <a:xfrm>
-          <a:off x="0" y="0"/>
-          <a:ext cx="0" cy="0"/>
-          <a:chOff x="0" y="0"/>
-          <a:chExt cx="0" cy="0"/>
-        </a:xfrm>
-      </p:grpSpPr>
-      <p:sp>
-        <p:nvSpPr>
-          <p:cNvPr id="2" name="Rectangle 1"/>
-          <p:cNvSpPr/>
-          <p:nvPr/>
-        </p:nvSpPr>
-        <p:spPr>
-          <a:xfrm>
-            <a:off x="4864609" y="241402"/>
-            <a:ext cx="3766728" cy="4508927"/>
-          </a:xfrm>
-          <a:prstGeom prst="rect">
-            <a:avLst/>
-          </a:prstGeom>
-          <a:noFill/>
-        </p:spPr>
-        <p:txBody>
-          <a:bodyPr wrap="square" lIns="91440" tIns="45720" rIns="91440" bIns="45720">
-            <a:spAutoFit/>
-          </a:bodyPr>
-          <a:lstStyle/>
-          <a:p>
-            <a:pPr algn="ctr"/>
-            <a:r>
-              <a:rPr lang="en-US" sz="28700" b="0" cap="none" spc="0" dirty="0" smtClean="0">
-                <a:ln w="0"/>
-                <a:solidFill>
-                  <a:srgbClr val="CFE2F3"/>
-                </a:solidFill>
-                <a:effectLst/>
-              </a:rPr>
-              <a:t>?</a:t>
-            </a:r>
-            <a:endParaRPr lang="en-US" sz="5400" b="0" cap="none" spc="0" dirty="0">
-              <a:ln w="0"/>
-              <a:solidFill>
-                <a:srgbClr val="CFE2F3"/>
-              </a:solidFill>
-              <a:effectLst/>
-            </a:endParaRPr>
-          </a:p>
-        </p:txBody>
-      </p:sp>
-      <p:sp>
-        <p:nvSpPr>
-          <p:cNvPr id="52" name="Shape 52"/>
-          <p:cNvSpPr txBox="1">
-            <a:spLocks noGrp="1"/>
-          </p:cNvSpPr>
-          <p:nvPr>
-            <p:ph type="ctrTitle" idx="4294967295"/>
-          </p:nvPr>
-        </p:nvSpPr>
-        <p:spPr>
-          <a:xfrm>
-            <a:off x="0" y="972922"/>
-            <a:ext cx="9144000" cy="3343046"/>
-          </a:xfrm>
-          <a:prstGeom prst="rect">
-            <a:avLst/>
-          </a:prstGeom>
-        </p:spPr>
-        <p:txBody>
-          <a:bodyPr lIns="91425" tIns="91425" rIns="91425" bIns="91425" anchor="ctr" anchorCtr="0">
-            <a:noAutofit/>
-          </a:bodyPr>
-          <a:lstStyle/>
-          <a:p>
-            <a:pPr marL="342900" indent="0">
-              <a:buNone/>
-            </a:pPr>
-            <a:r>
-              <a:rPr lang="en" dirty="0" smtClean="0"/>
-              <a:t>How is the task distributed among the different servers</a:t>
-            </a:r>
-            <a:endParaRPr lang="en" dirty="0"/>
-          </a:p>
-        </p:txBody>
-      </p:sp>
-    </p:spTree>
-    <p:extLst>
-      <p:ext uri="{BB962C8B-B14F-4D97-AF65-F5344CB8AC3E}">
-        <p14:creationId xmlns:p14="http://schemas.microsoft.com/office/powerpoint/2010/main" val="3476999096"/>
-      </p:ext>
-    </p:extLst>
   </p:cSld>
   <p:clrMapOvr>
     <a:masterClrMapping/>
@@ -9241,7 +9405,7 @@
   <p:cSld>
     <p:spTree>
       <p:nvGrpSpPr>
-        <p:cNvPr id="1" name="Shape 140"/>
+        <p:cNvPr id="1" name="Shape 51"/>
         <p:cNvGrpSpPr/>
         <p:nvPr/>
       </p:nvGrpSpPr>
@@ -9255,18 +9419,61 @@
       </p:grpSpPr>
       <p:sp>
         <p:nvSpPr>
-          <p:cNvPr id="141" name="Shape 141"/>
+          <p:cNvPr id="2" name="Rectangle 1"/>
+          <p:cNvSpPr/>
+          <p:nvPr/>
+        </p:nvSpPr>
+        <p:spPr>
+          <a:xfrm>
+            <a:off x="4864609" y="241402"/>
+            <a:ext cx="3766728" cy="4508927"/>
+          </a:xfrm>
+          <a:prstGeom prst="rect">
+            <a:avLst/>
+          </a:prstGeom>
+          <a:noFill/>
+        </p:spPr>
+        <p:txBody>
+          <a:bodyPr wrap="square" lIns="91440" tIns="45720" rIns="91440" bIns="45720">
+            <a:spAutoFit/>
+          </a:bodyPr>
+          <a:lstStyle/>
+          <a:p>
+            <a:pPr algn="ctr"/>
+            <a:r>
+              <a:rPr lang="en-US" sz="28700" b="0" cap="none" spc="0" dirty="0" smtClean="0">
+                <a:ln w="0"/>
+                <a:solidFill>
+                  <a:srgbClr val="CFE2F3"/>
+                </a:solidFill>
+                <a:effectLst/>
+              </a:rPr>
+              <a:t>?</a:t>
+            </a:r>
+            <a:endParaRPr lang="en-US" sz="5400" b="0" cap="none" spc="0" dirty="0">
+              <a:ln w="0"/>
+              <a:solidFill>
+                <a:srgbClr val="CFE2F3"/>
+              </a:solidFill>
+              <a:effectLst/>
+            </a:endParaRPr>
+          </a:p>
+        </p:txBody>
+      </p:sp>
+      <p:sp>
+        <p:nvSpPr>
+          <p:cNvPr id="52" name="Shape 52"/>
           <p:cNvSpPr txBox="1">
             <a:spLocks noGrp="1"/>
           </p:cNvSpPr>
           <p:nvPr>
-            <p:ph type="title"/>
+            <p:ph type="ctrTitle" idx="4294967295"/>
           </p:nvPr>
         </p:nvSpPr>
         <p:spPr>
           <a:xfrm>
-            <a:off x="457200" y="205978"/>
-            <a:ext cx="8229600" cy="857400"/>
+            <a:off x="0" y="972922"/>
+            <a:ext cx="9144000" cy="3343046"/>
           </a:xfrm>
           <a:prstGeom prst="rect">
             <a:avLst/>
@@ -9278,111 +9485,23 @@
           </a:bodyPr>
           <a:lstStyle/>
           <a:p>
-            <a:pPr lvl="0" rtl="0">
+            <a:pPr marL="342900" indent="0">
               <a:buNone/>
             </a:pPr>
             <a:r>
-              <a:rPr lang="en" dirty="0"/>
-              <a:t>Server </a:t>
-            </a:r>
-            <a:r>
               <a:rPr lang="en" dirty="0" smtClean="0"/>
-              <a:t>structure</a:t>
+              <a:t>How is the task distributed among the different servers</a:t>
             </a:r>
             <a:endParaRPr lang="en" dirty="0"/>
           </a:p>
         </p:txBody>
       </p:sp>
-      <p:sp>
-        <p:nvSpPr>
-          <p:cNvPr id="142" name="Shape 142"/>
-          <p:cNvSpPr txBox="1">
-            <a:spLocks noGrp="1"/>
-          </p:cNvSpPr>
-          <p:nvPr>
-            <p:ph type="body" idx="1"/>
-          </p:nvPr>
-        </p:nvSpPr>
-        <p:spPr>
-          <a:xfrm>
-            <a:off x="457200" y="1200150"/>
-            <a:ext cx="8229600" cy="3172199"/>
-          </a:xfrm>
-          <a:prstGeom prst="rect">
-            <a:avLst/>
-          </a:prstGeom>
-        </p:spPr>
-        <p:txBody>
-          <a:bodyPr lIns="91425" tIns="91425" rIns="91425" bIns="91425" anchor="ctr" anchorCtr="0">
-            <a:noAutofit/>
-          </a:bodyPr>
-          <a:lstStyle/>
-          <a:p>
-            <a:pPr lvl="0" rtl="0">
-              <a:buNone/>
-            </a:pPr>
-            <a:r>
-              <a:rPr lang="en" dirty="0"/>
-              <a:t>The server is:</a:t>
-            </a:r>
-          </a:p>
-          <a:p>
-            <a:pPr lvl="0"/>
-            <a:endParaRPr lang="en" sz="1050" dirty="0"/>
-          </a:p>
-          <a:p>
-            <a:pPr marL="457200" indent="-381000">
-              <a:lnSpc>
-                <a:spcPct val="150000"/>
-              </a:lnSpc>
-              <a:buSzPct val="166666"/>
-              <a:buFont typeface="Arial"/>
-              <a:buChar char="•"/>
-            </a:pPr>
-            <a:r>
-              <a:rPr lang="en" sz="2400" dirty="0"/>
-              <a:t>Using </a:t>
-            </a:r>
-            <a:r>
-              <a:rPr lang="en" sz="2400" dirty="0" smtClean="0"/>
-              <a:t>other servers</a:t>
-            </a:r>
-          </a:p>
-          <a:p>
-            <a:pPr marL="457200" indent="-381000">
-              <a:lnSpc>
-                <a:spcPct val="150000"/>
-              </a:lnSpc>
-              <a:buSzPct val="166666"/>
-              <a:buFont typeface="Arial"/>
-              <a:buChar char="•"/>
-            </a:pPr>
-            <a:r>
-              <a:rPr lang="en" sz="2400" dirty="0" smtClean="0"/>
-              <a:t>Using threads</a:t>
-            </a:r>
-          </a:p>
-          <a:p>
-            <a:pPr marL="457200" lvl="0" indent="-381000" rtl="0">
-              <a:lnSpc>
-                <a:spcPct val="150000"/>
-              </a:lnSpc>
-              <a:buClr>
-                <a:schemeClr val="dk1"/>
-              </a:buClr>
-              <a:buSzPct val="166666"/>
-              <a:buFont typeface="Arial"/>
-              <a:buChar char="•"/>
-            </a:pPr>
-            <a:r>
-              <a:rPr lang="en" sz="2400" dirty="0" smtClean="0"/>
-              <a:t>Modular</a:t>
-            </a:r>
-            <a:endParaRPr lang="en" sz="2400" dirty="0"/>
-          </a:p>
-        </p:txBody>
-      </p:sp>
     </p:spTree>
+    <p:extLst>
+      <p:ext uri="{BB962C8B-B14F-4D97-AF65-F5344CB8AC3E}">
+        <p14:creationId xmlns:p14="http://schemas.microsoft.com/office/powerpoint/2010/main" val="3476999096"/>
+      </p:ext>
+    </p:extLst>
   </p:cSld>
   <p:clrMapOvr>
     <a:masterClrMapping/>
@@ -9405,6 +9524,170 @@
   <p:cSld>
     <p:spTree>
       <p:nvGrpSpPr>
+        <p:cNvPr id="1" name="Shape 140"/>
+        <p:cNvGrpSpPr/>
+        <p:nvPr/>
+      </p:nvGrpSpPr>
+      <p:grpSpPr>
+        <a:xfrm>
+          <a:off x="0" y="0"/>
+          <a:ext cx="0" cy="0"/>
+          <a:chOff x="0" y="0"/>
+          <a:chExt cx="0" cy="0"/>
+        </a:xfrm>
+      </p:grpSpPr>
+      <p:sp>
+        <p:nvSpPr>
+          <p:cNvPr id="141" name="Shape 141"/>
+          <p:cNvSpPr txBox="1">
+            <a:spLocks noGrp="1"/>
+          </p:cNvSpPr>
+          <p:nvPr>
+            <p:ph type="title"/>
+          </p:nvPr>
+        </p:nvSpPr>
+        <p:spPr>
+          <a:xfrm>
+            <a:off x="457200" y="205978"/>
+            <a:ext cx="8229600" cy="857400"/>
+          </a:xfrm>
+          <a:prstGeom prst="rect">
+            <a:avLst/>
+          </a:prstGeom>
+        </p:spPr>
+        <p:txBody>
+          <a:bodyPr lIns="91425" tIns="91425" rIns="91425" bIns="91425" anchor="ctr" anchorCtr="0">
+            <a:noAutofit/>
+          </a:bodyPr>
+          <a:lstStyle/>
+          <a:p>
+            <a:pPr lvl="0" rtl="0">
+              <a:buNone/>
+            </a:pPr>
+            <a:r>
+              <a:rPr lang="en" dirty="0"/>
+              <a:t>Server </a:t>
+            </a:r>
+            <a:r>
+              <a:rPr lang="en" dirty="0" smtClean="0"/>
+              <a:t>structure</a:t>
+            </a:r>
+            <a:endParaRPr lang="en" dirty="0"/>
+          </a:p>
+        </p:txBody>
+      </p:sp>
+      <p:sp>
+        <p:nvSpPr>
+          <p:cNvPr id="142" name="Shape 142"/>
+          <p:cNvSpPr txBox="1">
+            <a:spLocks noGrp="1"/>
+          </p:cNvSpPr>
+          <p:nvPr>
+            <p:ph type="body" idx="1"/>
+          </p:nvPr>
+        </p:nvSpPr>
+        <p:spPr>
+          <a:xfrm>
+            <a:off x="457200" y="1200150"/>
+            <a:ext cx="8229600" cy="3172199"/>
+          </a:xfrm>
+          <a:prstGeom prst="rect">
+            <a:avLst/>
+          </a:prstGeom>
+        </p:spPr>
+        <p:txBody>
+          <a:bodyPr lIns="91425" tIns="91425" rIns="91425" bIns="91425" anchor="ctr" anchorCtr="0">
+            <a:noAutofit/>
+          </a:bodyPr>
+          <a:lstStyle/>
+          <a:p>
+            <a:pPr lvl="0" rtl="0">
+              <a:buNone/>
+            </a:pPr>
+            <a:r>
+              <a:rPr lang="en" dirty="0"/>
+              <a:t>The server is:</a:t>
+            </a:r>
+          </a:p>
+          <a:p>
+            <a:pPr lvl="0"/>
+            <a:endParaRPr lang="en" sz="1050" dirty="0"/>
+          </a:p>
+          <a:p>
+            <a:pPr marL="457200" indent="-381000">
+              <a:lnSpc>
+                <a:spcPct val="150000"/>
+              </a:lnSpc>
+              <a:buSzPct val="166666"/>
+              <a:buFont typeface="Arial"/>
+              <a:buChar char="•"/>
+            </a:pPr>
+            <a:r>
+              <a:rPr lang="en" sz="2400" dirty="0"/>
+              <a:t>Using </a:t>
+            </a:r>
+            <a:r>
+              <a:rPr lang="en" sz="2400" dirty="0" smtClean="0"/>
+              <a:t>other servers</a:t>
+            </a:r>
+          </a:p>
+          <a:p>
+            <a:pPr marL="457200" indent="-381000">
+              <a:lnSpc>
+                <a:spcPct val="150000"/>
+              </a:lnSpc>
+              <a:buSzPct val="166666"/>
+              <a:buFont typeface="Arial"/>
+              <a:buChar char="•"/>
+            </a:pPr>
+            <a:r>
+              <a:rPr lang="en" sz="2400" dirty="0" smtClean="0"/>
+              <a:t>Using threads</a:t>
+            </a:r>
+          </a:p>
+          <a:p>
+            <a:pPr marL="457200" lvl="0" indent="-381000" rtl="0">
+              <a:lnSpc>
+                <a:spcPct val="150000"/>
+              </a:lnSpc>
+              <a:buClr>
+                <a:schemeClr val="dk1"/>
+              </a:buClr>
+              <a:buSzPct val="166666"/>
+              <a:buFont typeface="Arial"/>
+              <a:buChar char="•"/>
+            </a:pPr>
+            <a:r>
+              <a:rPr lang="en" sz="2400" dirty="0" smtClean="0"/>
+              <a:t>Modular</a:t>
+            </a:r>
+            <a:endParaRPr lang="en" sz="2400" dirty="0"/>
+          </a:p>
+        </p:txBody>
+      </p:sp>
+    </p:spTree>
+  </p:cSld>
+  <p:clrMapOvr>
+    <a:masterClrMapping/>
+  </p:clrMapOvr>
+  <p:transition spd="slow">
+    <p:cut/>
+  </p:transition>
+  <p:timing>
+    <p:tnLst>
+      <p:par>
+        <p:cTn id="1" dur="indefinite" restart="never" nodeType="tmRoot"/>
+      </p:par>
+    </p:tnLst>
+  </p:timing>
+</p:sld>
+</file>
+
+<file path=ppt/slides/slide22.xml><?xml version="1.0" encoding="utf-8"?>
+<p:sld xmlns:a="http://schemas.openxmlformats.org/drawingml/2006/main" xmlns:r="http://schemas.openxmlformats.org/officeDocument/2006/relationships" xmlns:p="http://schemas.openxmlformats.org/presentationml/2006/main">
+  <p:cSld>
+    <p:spTree>
+      <p:nvGrpSpPr>
         <p:cNvPr id="1" name=""/>
         <p:cNvGrpSpPr/>
         <p:nvPr/>
@@ -9531,7 +9814,7 @@
 </p:sld>
 </file>
 
-<file path=ppt/slides/slide22.xml><?xml version="1.0" encoding="utf-8"?>
+<file path=ppt/slides/slide23.xml><?xml version="1.0" encoding="utf-8"?>
 <p:sld xmlns:a="http://schemas.openxmlformats.org/drawingml/2006/main" xmlns:r="http://schemas.openxmlformats.org/officeDocument/2006/relationships" xmlns:p="http://schemas.openxmlformats.org/presentationml/2006/main">
   <p:cSld>
     <p:spTree>
@@ -10085,560 +10368,6 @@
           </a:p>
         </p:txBody>
       </p:sp>
-    </p:spTree>
-  </p:cSld>
-  <p:clrMapOvr>
-    <a:masterClrMapping/>
-  </p:clrMapOvr>
-  <p:transition spd="slow">
-    <p:cut/>
-  </p:transition>
-  <p:timing>
-    <p:tnLst>
-      <p:par>
-        <p:cTn id="1" dur="indefinite" restart="never" nodeType="tmRoot"/>
-      </p:par>
-    </p:tnLst>
-  </p:timing>
-</p:sld>
-</file>
-
-<file path=ppt/slides/slide23.xml><?xml version="1.0" encoding="utf-8"?>
-<p:sld xmlns:a="http://schemas.openxmlformats.org/drawingml/2006/main" xmlns:r="http://schemas.openxmlformats.org/officeDocument/2006/relationships" xmlns:p="http://schemas.openxmlformats.org/presentationml/2006/main">
-  <p:cSld>
-    <p:spTree>
-      <p:nvGrpSpPr>
-        <p:cNvPr id="1" name="Shape 153"/>
-        <p:cNvGrpSpPr/>
-        <p:nvPr/>
-      </p:nvGrpSpPr>
-      <p:grpSpPr>
-        <a:xfrm>
-          <a:off x="0" y="0"/>
-          <a:ext cx="0" cy="0"/>
-          <a:chOff x="0" y="0"/>
-          <a:chExt cx="0" cy="0"/>
-        </a:xfrm>
-      </p:grpSpPr>
-      <p:sp>
-        <p:nvSpPr>
-          <p:cNvPr id="154" name="Shape 154"/>
-          <p:cNvSpPr txBox="1">
-            <a:spLocks noGrp="1"/>
-          </p:cNvSpPr>
-          <p:nvPr>
-            <p:ph type="title"/>
-          </p:nvPr>
-        </p:nvSpPr>
-        <p:spPr>
-          <a:xfrm>
-            <a:off x="457200" y="205978"/>
-            <a:ext cx="8229600" cy="857400"/>
-          </a:xfrm>
-          <a:prstGeom prst="rect">
-            <a:avLst/>
-          </a:prstGeom>
-        </p:spPr>
-        <p:txBody>
-          <a:bodyPr lIns="91425" tIns="91425" rIns="91425" bIns="91425" anchor="ctr" anchorCtr="0">
-            <a:noAutofit/>
-          </a:bodyPr>
-          <a:lstStyle/>
-          <a:p>
-            <a:pPr lvl="0" rtl="0">
-              <a:buNone/>
-            </a:pPr>
-            <a:r>
-              <a:rPr lang="en"/>
-              <a:t>Server: Modular</a:t>
-            </a:r>
-          </a:p>
-        </p:txBody>
-      </p:sp>
-      <p:sp>
-        <p:nvSpPr>
-          <p:cNvPr id="155" name="Shape 155"/>
-          <p:cNvSpPr txBox="1">
-            <a:spLocks noGrp="1"/>
-          </p:cNvSpPr>
-          <p:nvPr>
-            <p:ph type="body" idx="1"/>
-          </p:nvPr>
-        </p:nvSpPr>
-        <p:spPr>
-          <a:xfrm>
-            <a:off x="3757100" y="1200150"/>
-            <a:ext cx="5158200" cy="3201300"/>
-          </a:xfrm>
-          <a:prstGeom prst="rect">
-            <a:avLst/>
-          </a:prstGeom>
-        </p:spPr>
-        <p:txBody>
-          <a:bodyPr lIns="91425" tIns="91425" rIns="91425" bIns="91425" anchor="ctr" anchorCtr="0">
-            <a:noAutofit/>
-          </a:bodyPr>
-          <a:lstStyle/>
-          <a:p>
-            <a:pPr lvl="0" rtl="0">
-              <a:buNone/>
-            </a:pPr>
-            <a:r>
-              <a:rPr lang="en" sz="1800" dirty="0" smtClean="0"/>
-              <a:t>At start, </a:t>
-            </a:r>
-            <a:r>
-              <a:rPr lang="en" sz="1800" dirty="0"/>
-              <a:t>the server  will search for all </a:t>
-            </a:r>
-            <a:r>
-              <a:rPr lang="en" sz="1800" dirty="0" smtClean="0"/>
-              <a:t>modules, </a:t>
-            </a:r>
-            <a:r>
-              <a:rPr lang="en" sz="1800" dirty="0"/>
-              <a:t>and try to </a:t>
-            </a:r>
-            <a:r>
-              <a:rPr lang="en" sz="1800" dirty="0" smtClean="0"/>
-              <a:t>load </a:t>
-            </a:r>
-            <a:r>
-              <a:rPr lang="en" sz="1800" dirty="0"/>
-              <a:t>them.</a:t>
-            </a:r>
-          </a:p>
-          <a:p>
-            <a:endParaRPr lang="en" sz="1800" dirty="0"/>
-          </a:p>
-          <a:p>
-            <a:pPr lvl="0" rtl="0">
-              <a:buNone/>
-            </a:pPr>
-            <a:r>
-              <a:rPr lang="en" sz="1800" dirty="0"/>
-              <a:t>These modules include features such as :</a:t>
-            </a:r>
-          </a:p>
-          <a:p>
-            <a:pPr marL="457200" lvl="0" indent="-342900" rtl="0">
-              <a:buClr>
-                <a:schemeClr val="dk1"/>
-              </a:buClr>
-              <a:buSzPct val="166666"/>
-              <a:buFont typeface="Arial"/>
-              <a:buChar char="•"/>
-            </a:pPr>
-            <a:r>
-              <a:rPr lang="en" sz="1800" dirty="0"/>
-              <a:t>3D objects, like sphere or cylinder</a:t>
-            </a:r>
-          </a:p>
-          <a:p>
-            <a:pPr marL="457200" lvl="0" indent="-342900" rtl="0">
-              <a:buClr>
-                <a:schemeClr val="dk1"/>
-              </a:buClr>
-              <a:buSzPct val="166666"/>
-              <a:buFont typeface="Arial"/>
-              <a:buChar char="•"/>
-            </a:pPr>
-            <a:r>
-              <a:rPr lang="en" sz="1800" dirty="0"/>
-              <a:t>Transformations, like translation or rotation</a:t>
-            </a:r>
-          </a:p>
-          <a:p>
-            <a:pPr marL="457200" lvl="0" indent="-342900" rtl="0">
-              <a:buClr>
-                <a:schemeClr val="dk1"/>
-              </a:buClr>
-              <a:buSzPct val="166666"/>
-              <a:buFont typeface="Arial"/>
-              <a:buChar char="•"/>
-            </a:pPr>
-            <a:r>
-              <a:rPr lang="en" sz="1800" dirty="0"/>
-              <a:t>Shaders, like opacity or </a:t>
-            </a:r>
-            <a:r>
-              <a:rPr lang="en" sz="1800" dirty="0" smtClean="0"/>
-              <a:t>reflection</a:t>
-            </a:r>
-            <a:endParaRPr lang="en" sz="1800" dirty="0"/>
-          </a:p>
-        </p:txBody>
-      </p:sp>
-      <p:pic>
-        <p:nvPicPr>
-          <p:cNvPr id="156" name="Shape 156"/>
-          <p:cNvPicPr preferRelativeResize="0"/>
-          <p:nvPr/>
-        </p:nvPicPr>
-        <p:blipFill>
-          <a:blip r:embed="rId3"/>
-          <a:stretch>
-            <a:fillRect/>
-          </a:stretch>
-        </p:blipFill>
-        <p:spPr>
-          <a:xfrm>
-            <a:off x="457200" y="1386450"/>
-            <a:ext cx="400391" cy="371133"/>
-          </a:xfrm>
-          <a:prstGeom prst="rect">
-            <a:avLst/>
-          </a:prstGeom>
-          <a:noFill/>
-          <a:ln>
-            <a:noFill/>
-          </a:ln>
-        </p:spPr>
-      </p:pic>
-      <p:pic>
-        <p:nvPicPr>
-          <p:cNvPr id="157" name="Shape 157"/>
-          <p:cNvPicPr preferRelativeResize="0"/>
-          <p:nvPr/>
-        </p:nvPicPr>
-        <p:blipFill>
-          <a:blip r:embed="rId4"/>
-          <a:stretch>
-            <a:fillRect/>
-          </a:stretch>
-        </p:blipFill>
-        <p:spPr>
-          <a:xfrm>
-            <a:off x="861083" y="1858779"/>
-            <a:ext cx="400391" cy="491065"/>
-          </a:xfrm>
-          <a:prstGeom prst="rect">
-            <a:avLst/>
-          </a:prstGeom>
-          <a:noFill/>
-          <a:ln>
-            <a:noFill/>
-          </a:ln>
-        </p:spPr>
-      </p:pic>
-      <p:pic>
-        <p:nvPicPr>
-          <p:cNvPr id="158" name="Shape 158"/>
-          <p:cNvPicPr preferRelativeResize="0"/>
-          <p:nvPr/>
-        </p:nvPicPr>
-        <p:blipFill>
-          <a:blip r:embed="rId4"/>
-          <a:stretch>
-            <a:fillRect/>
-          </a:stretch>
-        </p:blipFill>
-        <p:spPr>
-          <a:xfrm>
-            <a:off x="861083" y="2451049"/>
-            <a:ext cx="400391" cy="491065"/>
-          </a:xfrm>
-          <a:prstGeom prst="rect">
-            <a:avLst/>
-          </a:prstGeom>
-          <a:noFill/>
-          <a:ln>
-            <a:noFill/>
-          </a:ln>
-        </p:spPr>
-      </p:pic>
-      <p:pic>
-        <p:nvPicPr>
-          <p:cNvPr id="159" name="Shape 159"/>
-          <p:cNvPicPr preferRelativeResize="0"/>
-          <p:nvPr/>
-        </p:nvPicPr>
-        <p:blipFill>
-          <a:blip r:embed="rId4"/>
-          <a:stretch>
-            <a:fillRect/>
-          </a:stretch>
-        </p:blipFill>
-        <p:spPr>
-          <a:xfrm>
-            <a:off x="861083" y="3043298"/>
-            <a:ext cx="400391" cy="491065"/>
-          </a:xfrm>
-          <a:prstGeom prst="rect">
-            <a:avLst/>
-          </a:prstGeom>
-          <a:noFill/>
-          <a:ln>
-            <a:noFill/>
-          </a:ln>
-        </p:spPr>
-      </p:pic>
-      <p:pic>
-        <p:nvPicPr>
-          <p:cNvPr id="160" name="Shape 160"/>
-          <p:cNvPicPr preferRelativeResize="0"/>
-          <p:nvPr/>
-        </p:nvPicPr>
-        <p:blipFill>
-          <a:blip r:embed="rId4"/>
-          <a:stretch>
-            <a:fillRect/>
-          </a:stretch>
-        </p:blipFill>
-        <p:spPr>
-          <a:xfrm>
-            <a:off x="861083" y="3635559"/>
-            <a:ext cx="400391" cy="491065"/>
-          </a:xfrm>
-          <a:prstGeom prst="rect">
-            <a:avLst/>
-          </a:prstGeom>
-          <a:noFill/>
-          <a:ln>
-            <a:noFill/>
-          </a:ln>
-        </p:spPr>
-      </p:pic>
-      <p:sp>
-        <p:nvSpPr>
-          <p:cNvPr id="161" name="Shape 161"/>
-          <p:cNvSpPr txBox="1"/>
-          <p:nvPr/>
-        </p:nvSpPr>
-        <p:spPr>
-          <a:xfrm>
-            <a:off x="1054725" y="1326475"/>
-            <a:ext cx="989699" cy="491099"/>
-          </a:xfrm>
-          <a:prstGeom prst="rect">
-            <a:avLst/>
-          </a:prstGeom>
-        </p:spPr>
-        <p:txBody>
-          <a:bodyPr lIns="91425" tIns="91425" rIns="91425" bIns="91425" anchor="ctr" anchorCtr="0">
-            <a:noAutofit/>
-          </a:bodyPr>
-          <a:lstStyle/>
-          <a:p>
-            <a:pPr lvl="0" rtl="0">
-              <a:buNone/>
-            </a:pPr>
-            <a:r>
-              <a:rPr lang="en"/>
-              <a:t>Modules/</a:t>
-            </a:r>
-          </a:p>
-        </p:txBody>
-      </p:sp>
-      <p:sp>
-        <p:nvSpPr>
-          <p:cNvPr id="162" name="Shape 162"/>
-          <p:cNvSpPr txBox="1"/>
-          <p:nvPr/>
-        </p:nvSpPr>
-        <p:spPr>
-          <a:xfrm>
-            <a:off x="1341525" y="1898525"/>
-            <a:ext cx="1841099" cy="2169899"/>
-          </a:xfrm>
-          <a:prstGeom prst="rect">
-            <a:avLst/>
-          </a:prstGeom>
-        </p:spPr>
-        <p:txBody>
-          <a:bodyPr lIns="91425" tIns="91425" rIns="91425" bIns="91425" anchor="t" anchorCtr="0">
-            <a:noAutofit/>
-          </a:bodyPr>
-          <a:lstStyle/>
-          <a:p>
-            <a:pPr lvl="0" rtl="0">
-              <a:buNone/>
-            </a:pPr>
-            <a:r>
-              <a:rPr lang="en" dirty="0" smtClean="0"/>
-              <a:t>BasicLight.so</a:t>
-            </a:r>
-            <a:endParaRPr lang="en" dirty="0"/>
-          </a:p>
-          <a:p>
-            <a:endParaRPr lang="en" dirty="0"/>
-          </a:p>
-          <a:p>
-            <a:endParaRPr lang="en" dirty="0"/>
-          </a:p>
-          <a:p>
-            <a:pPr lvl="0" rtl="0">
-              <a:buNone/>
-            </a:pPr>
-            <a:r>
-              <a:rPr lang="en" dirty="0"/>
-              <a:t>BasicObject.so</a:t>
-            </a:r>
-          </a:p>
-          <a:p>
-            <a:endParaRPr lang="en" dirty="0"/>
-          </a:p>
-          <a:p>
-            <a:endParaRPr lang="en" dirty="0"/>
-          </a:p>
-          <a:p>
-            <a:pPr lvl="0" rtl="0">
-              <a:buNone/>
-            </a:pPr>
-            <a:r>
-              <a:rPr lang="en" dirty="0"/>
-              <a:t>BasicTransform.so</a:t>
-            </a:r>
-          </a:p>
-          <a:p>
-            <a:endParaRPr lang="en" dirty="0"/>
-          </a:p>
-          <a:p>
-            <a:endParaRPr lang="en" dirty="0"/>
-          </a:p>
-          <a:p>
-            <a:pPr lvl="0" rtl="0">
-              <a:buNone/>
-            </a:pPr>
-            <a:r>
-              <a:rPr lang="en" dirty="0"/>
-              <a:t>AdvancedLight.so</a:t>
-            </a:r>
-          </a:p>
-        </p:txBody>
-      </p:sp>
-      <p:cxnSp>
-        <p:nvCxnSpPr>
-          <p:cNvPr id="163" name="Shape 163"/>
-          <p:cNvCxnSpPr/>
-          <p:nvPr/>
-        </p:nvCxnSpPr>
-        <p:spPr>
-          <a:xfrm>
-            <a:off x="676650" y="1767925"/>
-            <a:ext cx="0" cy="2109899"/>
-          </a:xfrm>
-          <a:prstGeom prst="straightConnector1">
-            <a:avLst/>
-          </a:prstGeom>
-          <a:noFill/>
-          <a:ln w="28575" cap="flat">
-            <a:solidFill>
-              <a:schemeClr val="dk2"/>
-            </a:solidFill>
-            <a:prstDash val="dot"/>
-            <a:round/>
-            <a:headEnd type="none" w="lg" len="lg"/>
-            <a:tailEnd type="none" w="lg" len="lg"/>
-          </a:ln>
-        </p:spPr>
-      </p:cxnSp>
-      <p:cxnSp>
-        <p:nvCxnSpPr>
-          <p:cNvPr id="164" name="Shape 164"/>
-          <p:cNvCxnSpPr>
-            <a:stCxn id="157" idx="1"/>
-          </p:cNvCxnSpPr>
-          <p:nvPr/>
-        </p:nvCxnSpPr>
-        <p:spPr>
-          <a:xfrm rot="10800000">
-            <a:off x="676583" y="2104312"/>
-            <a:ext cx="184500" cy="0"/>
-          </a:xfrm>
-          <a:prstGeom prst="straightConnector1">
-            <a:avLst/>
-          </a:prstGeom>
-          <a:noFill/>
-          <a:ln w="19050" cap="flat">
-            <a:solidFill>
-              <a:schemeClr val="dk2"/>
-            </a:solidFill>
-            <a:prstDash val="solid"/>
-            <a:round/>
-            <a:headEnd type="none" w="lg" len="lg"/>
-            <a:tailEnd type="none" w="lg" len="lg"/>
-          </a:ln>
-        </p:spPr>
-      </p:cxnSp>
-      <p:cxnSp>
-        <p:nvCxnSpPr>
-          <p:cNvPr id="165" name="Shape 165"/>
-          <p:cNvCxnSpPr/>
-          <p:nvPr/>
-        </p:nvCxnSpPr>
-        <p:spPr>
-          <a:xfrm rot="10800000">
-            <a:off x="676583" y="2713912"/>
-            <a:ext cx="184500" cy="0"/>
-          </a:xfrm>
-          <a:prstGeom prst="straightConnector1">
-            <a:avLst/>
-          </a:prstGeom>
-          <a:noFill/>
-          <a:ln w="19050" cap="flat">
-            <a:solidFill>
-              <a:schemeClr val="dk2"/>
-            </a:solidFill>
-            <a:prstDash val="solid"/>
-            <a:round/>
-            <a:headEnd type="none" w="lg" len="lg"/>
-            <a:tailEnd type="none" w="lg" len="lg"/>
-          </a:ln>
-        </p:spPr>
-      </p:cxnSp>
-      <p:cxnSp>
-        <p:nvCxnSpPr>
-          <p:cNvPr id="166" name="Shape 166"/>
-          <p:cNvCxnSpPr/>
-          <p:nvPr/>
-        </p:nvCxnSpPr>
-        <p:spPr>
-          <a:xfrm rot="10800000">
-            <a:off x="676583" y="3323512"/>
-            <a:ext cx="184500" cy="0"/>
-          </a:xfrm>
-          <a:prstGeom prst="straightConnector1">
-            <a:avLst/>
-          </a:prstGeom>
-          <a:noFill/>
-          <a:ln w="19050" cap="flat">
-            <a:solidFill>
-              <a:schemeClr val="dk2"/>
-            </a:solidFill>
-            <a:prstDash val="solid"/>
-            <a:round/>
-            <a:headEnd type="none" w="lg" len="lg"/>
-            <a:tailEnd type="none" w="lg" len="lg"/>
-          </a:ln>
-        </p:spPr>
-      </p:cxnSp>
-      <p:cxnSp>
-        <p:nvCxnSpPr>
-          <p:cNvPr id="167" name="Shape 167"/>
-          <p:cNvCxnSpPr/>
-          <p:nvPr/>
-        </p:nvCxnSpPr>
-        <p:spPr>
-          <a:xfrm rot="10800000">
-            <a:off x="676583" y="3856912"/>
-            <a:ext cx="184500" cy="0"/>
-          </a:xfrm>
-          <a:prstGeom prst="straightConnector1">
-            <a:avLst/>
-          </a:prstGeom>
-          <a:noFill/>
-          <a:ln w="19050" cap="flat">
-            <a:solidFill>
-              <a:schemeClr val="dk2"/>
-            </a:solidFill>
-            <a:prstDash val="solid"/>
-            <a:round/>
-            <a:headEnd type="none" w="lg" len="lg"/>
-            <a:tailEnd type="none" w="lg" len="lg"/>
-          </a:ln>
-        </p:spPr>
-      </p:cxnSp>
     </p:spTree>
   </p:cSld>
   <p:clrMapOvr>
@@ -10662,7 +10391,7 @@
   <p:cSld>
     <p:spTree>
       <p:nvGrpSpPr>
-        <p:cNvPr id="1" name="Shape 340"/>
+        <p:cNvPr id="1" name="Shape 153"/>
         <p:cNvGrpSpPr/>
         <p:nvPr/>
       </p:nvGrpSpPr>
@@ -10676,18 +10405,18 @@
       </p:grpSpPr>
       <p:sp>
         <p:nvSpPr>
-          <p:cNvPr id="341" name="Shape 341"/>
+          <p:cNvPr id="154" name="Shape 154"/>
           <p:cNvSpPr txBox="1">
             <a:spLocks noGrp="1"/>
           </p:cNvSpPr>
           <p:nvPr>
-            <p:ph type="ctrTitle"/>
+            <p:ph type="title"/>
           </p:nvPr>
         </p:nvSpPr>
         <p:spPr>
           <a:xfrm>
-            <a:off x="685800" y="1728725"/>
-            <a:ext cx="7772400" cy="1227299"/>
+            <a:off x="457200" y="205978"/>
+            <a:ext cx="8229600" cy="857400"/>
           </a:xfrm>
           <a:prstGeom prst="rect">
             <a:avLst/>
@@ -10700,34 +10429,499 @@
           <a:lstStyle/>
           <a:p>
             <a:pPr lvl="0" rtl="0">
-              <a:spcBef>
-                <a:spcPts val="600"/>
-              </a:spcBef>
+              <a:buNone/>
+            </a:pPr>
+            <a:r>
+              <a:rPr lang="en"/>
+              <a:t>Server: Modular</a:t>
+            </a:r>
+          </a:p>
+        </p:txBody>
+      </p:sp>
+      <p:sp>
+        <p:nvSpPr>
+          <p:cNvPr id="155" name="Shape 155"/>
+          <p:cNvSpPr txBox="1">
+            <a:spLocks noGrp="1"/>
+          </p:cNvSpPr>
+          <p:nvPr>
+            <p:ph type="body" idx="1"/>
+          </p:nvPr>
+        </p:nvSpPr>
+        <p:spPr>
+          <a:xfrm>
+            <a:off x="3757100" y="1200150"/>
+            <a:ext cx="5158200" cy="3201300"/>
+          </a:xfrm>
+          <a:prstGeom prst="rect">
+            <a:avLst/>
+          </a:prstGeom>
+        </p:spPr>
+        <p:txBody>
+          <a:bodyPr lIns="91425" tIns="91425" rIns="91425" bIns="91425" anchor="ctr" anchorCtr="0">
+            <a:noAutofit/>
+          </a:bodyPr>
+          <a:lstStyle/>
+          <a:p>
+            <a:pPr lvl="0" rtl="0">
+              <a:buNone/>
+            </a:pPr>
+            <a:r>
+              <a:rPr lang="en" sz="1800" dirty="0" smtClean="0"/>
+              <a:t>At start, </a:t>
+            </a:r>
+            <a:r>
+              <a:rPr lang="en" sz="1800" dirty="0"/>
+              <a:t>the server  will search for all </a:t>
+            </a:r>
+            <a:r>
+              <a:rPr lang="en" sz="1800" dirty="0" smtClean="0"/>
+              <a:t>modules, </a:t>
+            </a:r>
+            <a:r>
+              <a:rPr lang="en" sz="1800" dirty="0"/>
+              <a:t>and try to </a:t>
+            </a:r>
+            <a:r>
+              <a:rPr lang="en" sz="1800" dirty="0" smtClean="0"/>
+              <a:t>load </a:t>
+            </a:r>
+            <a:r>
+              <a:rPr lang="en" sz="1800" dirty="0"/>
+              <a:t>them.</a:t>
+            </a:r>
+          </a:p>
+          <a:p>
+            <a:endParaRPr lang="en" sz="1800" dirty="0"/>
+          </a:p>
+          <a:p>
+            <a:pPr lvl="0" rtl="0">
+              <a:buNone/>
+            </a:pPr>
+            <a:r>
+              <a:rPr lang="en" sz="1800" dirty="0"/>
+              <a:t>These modules include features such as :</a:t>
+            </a:r>
+          </a:p>
+          <a:p>
+            <a:pPr marL="457200" lvl="0" indent="-342900" rtl="0">
               <a:buClr>
                 <a:schemeClr val="dk1"/>
               </a:buClr>
-              <a:buSzPct val="25000"/>
+              <a:buSzPct val="166666"/>
               <a:buFont typeface="Arial"/>
+              <a:buChar char="•"/>
+            </a:pPr>
+            <a:r>
+              <a:rPr lang="en" sz="1800" dirty="0"/>
+              <a:t>3D objects, like sphere or cylinder</a:t>
+            </a:r>
+          </a:p>
+          <a:p>
+            <a:pPr marL="457200" lvl="0" indent="-342900" rtl="0">
+              <a:buClr>
+                <a:schemeClr val="dk1"/>
+              </a:buClr>
+              <a:buSzPct val="166666"/>
+              <a:buFont typeface="Arial"/>
+              <a:buChar char="•"/>
+            </a:pPr>
+            <a:r>
+              <a:rPr lang="en" sz="1800" dirty="0"/>
+              <a:t>Transformations, like translation or rotation</a:t>
+            </a:r>
+          </a:p>
+          <a:p>
+            <a:pPr marL="457200" lvl="0" indent="-342900" rtl="0">
+              <a:buClr>
+                <a:schemeClr val="dk1"/>
+              </a:buClr>
+              <a:buSzPct val="166666"/>
+              <a:buFont typeface="Arial"/>
+              <a:buChar char="•"/>
+            </a:pPr>
+            <a:r>
+              <a:rPr lang="en" sz="1800" dirty="0"/>
+              <a:t>Shaders, like opacity or </a:t>
+            </a:r>
+            <a:r>
+              <a:rPr lang="en" sz="1800" dirty="0" smtClean="0"/>
+              <a:t>reflection</a:t>
+            </a:r>
+            <a:endParaRPr lang="en" sz="1800" dirty="0"/>
+          </a:p>
+        </p:txBody>
+      </p:sp>
+      <p:pic>
+        <p:nvPicPr>
+          <p:cNvPr id="156" name="Shape 156"/>
+          <p:cNvPicPr preferRelativeResize="0"/>
+          <p:nvPr/>
+        </p:nvPicPr>
+        <p:blipFill>
+          <a:blip r:embed="rId3"/>
+          <a:stretch>
+            <a:fillRect/>
+          </a:stretch>
+        </p:blipFill>
+        <p:spPr>
+          <a:xfrm>
+            <a:off x="457200" y="1386450"/>
+            <a:ext cx="400391" cy="371133"/>
+          </a:xfrm>
+          <a:prstGeom prst="rect">
+            <a:avLst/>
+          </a:prstGeom>
+          <a:noFill/>
+          <a:ln>
+            <a:noFill/>
+          </a:ln>
+        </p:spPr>
+      </p:pic>
+      <p:pic>
+        <p:nvPicPr>
+          <p:cNvPr id="157" name="Shape 157"/>
+          <p:cNvPicPr preferRelativeResize="0"/>
+          <p:nvPr/>
+        </p:nvPicPr>
+        <p:blipFill>
+          <a:blip r:embed="rId4"/>
+          <a:stretch>
+            <a:fillRect/>
+          </a:stretch>
+        </p:blipFill>
+        <p:spPr>
+          <a:xfrm>
+            <a:off x="861083" y="1858779"/>
+            <a:ext cx="400391" cy="491065"/>
+          </a:xfrm>
+          <a:prstGeom prst="rect">
+            <a:avLst/>
+          </a:prstGeom>
+          <a:noFill/>
+          <a:ln>
+            <a:noFill/>
+          </a:ln>
+        </p:spPr>
+      </p:pic>
+      <p:pic>
+        <p:nvPicPr>
+          <p:cNvPr id="158" name="Shape 158"/>
+          <p:cNvPicPr preferRelativeResize="0"/>
+          <p:nvPr/>
+        </p:nvPicPr>
+        <p:blipFill>
+          <a:blip r:embed="rId4"/>
+          <a:stretch>
+            <a:fillRect/>
+          </a:stretch>
+        </p:blipFill>
+        <p:spPr>
+          <a:xfrm>
+            <a:off x="861083" y="2451049"/>
+            <a:ext cx="400391" cy="491065"/>
+          </a:xfrm>
+          <a:prstGeom prst="rect">
+            <a:avLst/>
+          </a:prstGeom>
+          <a:noFill/>
+          <a:ln>
+            <a:noFill/>
+          </a:ln>
+        </p:spPr>
+      </p:pic>
+      <p:pic>
+        <p:nvPicPr>
+          <p:cNvPr id="159" name="Shape 159"/>
+          <p:cNvPicPr preferRelativeResize="0"/>
+          <p:nvPr/>
+        </p:nvPicPr>
+        <p:blipFill>
+          <a:blip r:embed="rId4"/>
+          <a:stretch>
+            <a:fillRect/>
+          </a:stretch>
+        </p:blipFill>
+        <p:spPr>
+          <a:xfrm>
+            <a:off x="861083" y="3043298"/>
+            <a:ext cx="400391" cy="491065"/>
+          </a:xfrm>
+          <a:prstGeom prst="rect">
+            <a:avLst/>
+          </a:prstGeom>
+          <a:noFill/>
+          <a:ln>
+            <a:noFill/>
+          </a:ln>
+        </p:spPr>
+      </p:pic>
+      <p:pic>
+        <p:nvPicPr>
+          <p:cNvPr id="160" name="Shape 160"/>
+          <p:cNvPicPr preferRelativeResize="0"/>
+          <p:nvPr/>
+        </p:nvPicPr>
+        <p:blipFill>
+          <a:blip r:embed="rId4"/>
+          <a:stretch>
+            <a:fillRect/>
+          </a:stretch>
+        </p:blipFill>
+        <p:spPr>
+          <a:xfrm>
+            <a:off x="861083" y="3635559"/>
+            <a:ext cx="400391" cy="491065"/>
+          </a:xfrm>
+          <a:prstGeom prst="rect">
+            <a:avLst/>
+          </a:prstGeom>
+          <a:noFill/>
+          <a:ln>
+            <a:noFill/>
+          </a:ln>
+        </p:spPr>
+      </p:pic>
+      <p:sp>
+        <p:nvSpPr>
+          <p:cNvPr id="161" name="Shape 161"/>
+          <p:cNvSpPr txBox="1"/>
+          <p:nvPr/>
+        </p:nvSpPr>
+        <p:spPr>
+          <a:xfrm>
+            <a:off x="1054725" y="1326475"/>
+            <a:ext cx="989699" cy="491099"/>
+          </a:xfrm>
+          <a:prstGeom prst="rect">
+            <a:avLst/>
+          </a:prstGeom>
+        </p:spPr>
+        <p:txBody>
+          <a:bodyPr lIns="91425" tIns="91425" rIns="91425" bIns="91425" anchor="ctr" anchorCtr="0">
+            <a:noAutofit/>
+          </a:bodyPr>
+          <a:lstStyle/>
+          <a:p>
+            <a:pPr lvl="0" rtl="0">
               <a:buNone/>
             </a:pPr>
             <a:r>
-              <a:rPr lang="en" sz="7200">
-                <a:solidFill>
-                  <a:srgbClr val="FFFFFF"/>
-                </a:solidFill>
-              </a:rPr>
-              <a:t>Let’s see it in action !</a:t>
-            </a:r>
-          </a:p>
-          <a:p>
-            <a:endParaRPr lang="en" sz="7200">
-              <a:solidFill>
-                <a:srgbClr val="FFFFFF"/>
-              </a:solidFill>
-            </a:endParaRPr>
-          </a:p>
-        </p:txBody>
-      </p:sp>
+              <a:rPr lang="en"/>
+              <a:t>Modules/</a:t>
+            </a:r>
+          </a:p>
+        </p:txBody>
+      </p:sp>
+      <p:sp>
+        <p:nvSpPr>
+          <p:cNvPr id="162" name="Shape 162"/>
+          <p:cNvSpPr txBox="1"/>
+          <p:nvPr/>
+        </p:nvSpPr>
+        <p:spPr>
+          <a:xfrm>
+            <a:off x="1341525" y="1898525"/>
+            <a:ext cx="1841099" cy="2169899"/>
+          </a:xfrm>
+          <a:prstGeom prst="rect">
+            <a:avLst/>
+          </a:prstGeom>
+        </p:spPr>
+        <p:txBody>
+          <a:bodyPr lIns="91425" tIns="91425" rIns="91425" bIns="91425" anchor="t" anchorCtr="0">
+            <a:noAutofit/>
+          </a:bodyPr>
+          <a:lstStyle/>
+          <a:p>
+            <a:pPr lvl="0" rtl="0">
+              <a:buNone/>
+            </a:pPr>
+            <a:r>
+              <a:rPr lang="en" dirty="0" smtClean="0"/>
+              <a:t>BasicLight.so</a:t>
+            </a:r>
+            <a:endParaRPr lang="en" dirty="0"/>
+          </a:p>
+          <a:p>
+            <a:endParaRPr lang="en" dirty="0"/>
+          </a:p>
+          <a:p>
+            <a:endParaRPr lang="en" dirty="0"/>
+          </a:p>
+          <a:p>
+            <a:pPr lvl="0" rtl="0">
+              <a:buNone/>
+            </a:pPr>
+            <a:r>
+              <a:rPr lang="en" dirty="0"/>
+              <a:t>BasicObject.so</a:t>
+            </a:r>
+          </a:p>
+          <a:p>
+            <a:endParaRPr lang="en" dirty="0"/>
+          </a:p>
+          <a:p>
+            <a:endParaRPr lang="en" dirty="0"/>
+          </a:p>
+          <a:p>
+            <a:pPr lvl="0" rtl="0">
+              <a:buNone/>
+            </a:pPr>
+            <a:r>
+              <a:rPr lang="en" dirty="0"/>
+              <a:t>BasicTransform.so</a:t>
+            </a:r>
+          </a:p>
+          <a:p>
+            <a:endParaRPr lang="en" dirty="0"/>
+          </a:p>
+          <a:p>
+            <a:endParaRPr lang="en" dirty="0"/>
+          </a:p>
+          <a:p>
+            <a:pPr lvl="0" rtl="0">
+              <a:buNone/>
+            </a:pPr>
+            <a:r>
+              <a:rPr lang="en" dirty="0"/>
+              <a:t>AdvancedLight.so</a:t>
+            </a:r>
+          </a:p>
+        </p:txBody>
+      </p:sp>
+      <p:cxnSp>
+        <p:nvCxnSpPr>
+          <p:cNvPr id="163" name="Shape 163"/>
+          <p:cNvCxnSpPr/>
+          <p:nvPr/>
+        </p:nvCxnSpPr>
+        <p:spPr>
+          <a:xfrm>
+            <a:off x="676650" y="1767925"/>
+            <a:ext cx="0" cy="2109899"/>
+          </a:xfrm>
+          <a:prstGeom prst="straightConnector1">
+            <a:avLst/>
+          </a:prstGeom>
+          <a:noFill/>
+          <a:ln w="28575" cap="flat">
+            <a:solidFill>
+              <a:schemeClr val="dk2"/>
+            </a:solidFill>
+            <a:prstDash val="dot"/>
+            <a:round/>
+            <a:headEnd type="none" w="lg" len="lg"/>
+            <a:tailEnd type="none" w="lg" len="lg"/>
+          </a:ln>
+        </p:spPr>
+      </p:cxnSp>
+      <p:cxnSp>
+        <p:nvCxnSpPr>
+          <p:cNvPr id="164" name="Shape 164"/>
+          <p:cNvCxnSpPr>
+            <a:stCxn id="157" idx="1"/>
+          </p:cNvCxnSpPr>
+          <p:nvPr/>
+        </p:nvCxnSpPr>
+        <p:spPr>
+          <a:xfrm rot="10800000">
+            <a:off x="676583" y="2104312"/>
+            <a:ext cx="184500" cy="0"/>
+          </a:xfrm>
+          <a:prstGeom prst="straightConnector1">
+            <a:avLst/>
+          </a:prstGeom>
+          <a:noFill/>
+          <a:ln w="19050" cap="flat">
+            <a:solidFill>
+              <a:schemeClr val="dk2"/>
+            </a:solidFill>
+            <a:prstDash val="solid"/>
+            <a:round/>
+            <a:headEnd type="none" w="lg" len="lg"/>
+            <a:tailEnd type="none" w="lg" len="lg"/>
+          </a:ln>
+        </p:spPr>
+      </p:cxnSp>
+      <p:cxnSp>
+        <p:nvCxnSpPr>
+          <p:cNvPr id="165" name="Shape 165"/>
+          <p:cNvCxnSpPr/>
+          <p:nvPr/>
+        </p:nvCxnSpPr>
+        <p:spPr>
+          <a:xfrm rot="10800000">
+            <a:off x="676583" y="2713912"/>
+            <a:ext cx="184500" cy="0"/>
+          </a:xfrm>
+          <a:prstGeom prst="straightConnector1">
+            <a:avLst/>
+          </a:prstGeom>
+          <a:noFill/>
+          <a:ln w="19050" cap="flat">
+            <a:solidFill>
+              <a:schemeClr val="dk2"/>
+            </a:solidFill>
+            <a:prstDash val="solid"/>
+            <a:round/>
+            <a:headEnd type="none" w="lg" len="lg"/>
+            <a:tailEnd type="none" w="lg" len="lg"/>
+          </a:ln>
+        </p:spPr>
+      </p:cxnSp>
+      <p:cxnSp>
+        <p:nvCxnSpPr>
+          <p:cNvPr id="166" name="Shape 166"/>
+          <p:cNvCxnSpPr/>
+          <p:nvPr/>
+        </p:nvCxnSpPr>
+        <p:spPr>
+          <a:xfrm rot="10800000">
+            <a:off x="676583" y="3323512"/>
+            <a:ext cx="184500" cy="0"/>
+          </a:xfrm>
+          <a:prstGeom prst="straightConnector1">
+            <a:avLst/>
+          </a:prstGeom>
+          <a:noFill/>
+          <a:ln w="19050" cap="flat">
+            <a:solidFill>
+              <a:schemeClr val="dk2"/>
+            </a:solidFill>
+            <a:prstDash val="solid"/>
+            <a:round/>
+            <a:headEnd type="none" w="lg" len="lg"/>
+            <a:tailEnd type="none" w="lg" len="lg"/>
+          </a:ln>
+        </p:spPr>
+      </p:cxnSp>
+      <p:cxnSp>
+        <p:nvCxnSpPr>
+          <p:cNvPr id="167" name="Shape 167"/>
+          <p:cNvCxnSpPr/>
+          <p:nvPr/>
+        </p:nvCxnSpPr>
+        <p:spPr>
+          <a:xfrm rot="10800000">
+            <a:off x="676583" y="3856912"/>
+            <a:ext cx="184500" cy="0"/>
+          </a:xfrm>
+          <a:prstGeom prst="straightConnector1">
+            <a:avLst/>
+          </a:prstGeom>
+          <a:noFill/>
+          <a:ln w="19050" cap="flat">
+            <a:solidFill>
+              <a:schemeClr val="dk2"/>
+            </a:solidFill>
+            <a:prstDash val="solid"/>
+            <a:round/>
+            <a:headEnd type="none" w="lg" len="lg"/>
+            <a:tailEnd type="none" w="lg" len="lg"/>
+          </a:ln>
+        </p:spPr>
+      </p:cxnSp>
     </p:spTree>
   </p:cSld>
   <p:clrMapOvr>
@@ -10751,7 +10945,7 @@
   <p:cSld>
     <p:spTree>
       <p:nvGrpSpPr>
-        <p:cNvPr id="1" name="Shape 345"/>
+        <p:cNvPr id="1" name="Shape 340"/>
         <p:cNvGrpSpPr/>
         <p:nvPr/>
       </p:nvGrpSpPr>
@@ -10765,18 +10959,18 @@
       </p:grpSpPr>
       <p:sp>
         <p:nvSpPr>
-          <p:cNvPr id="346" name="Shape 346"/>
+          <p:cNvPr id="341" name="Shape 341"/>
           <p:cNvSpPr txBox="1">
             <a:spLocks noGrp="1"/>
           </p:cNvSpPr>
           <p:nvPr>
-            <p:ph type="title"/>
+            <p:ph type="ctrTitle"/>
           </p:nvPr>
         </p:nvSpPr>
         <p:spPr>
           <a:xfrm>
-            <a:off x="457200" y="205978"/>
-            <a:ext cx="8229600" cy="857400"/>
+            <a:off x="685800" y="1728725"/>
+            <a:ext cx="7772400" cy="1227299"/>
           </a:xfrm>
           <a:prstGeom prst="rect">
             <a:avLst/>
@@ -10789,111 +10983,31 @@
           <a:lstStyle/>
           <a:p>
             <a:pPr lvl="0" rtl="0">
-              <a:buNone/>
-            </a:pPr>
-            <a:r>
-              <a:rPr lang="en"/>
-              <a:t>Specials thanks</a:t>
-            </a:r>
-          </a:p>
-        </p:txBody>
-      </p:sp>
-      <p:sp>
-        <p:nvSpPr>
-          <p:cNvPr id="347" name="Shape 347"/>
-          <p:cNvSpPr txBox="1">
-            <a:spLocks noGrp="1"/>
-          </p:cNvSpPr>
-          <p:nvPr>
-            <p:ph type="body" idx="1"/>
-          </p:nvPr>
-        </p:nvSpPr>
-        <p:spPr>
-          <a:xfrm>
-            <a:off x="457200" y="1200150"/>
-            <a:ext cx="8229600" cy="3252300"/>
-          </a:xfrm>
-          <a:prstGeom prst="rect">
-            <a:avLst/>
-          </a:prstGeom>
-        </p:spPr>
-        <p:txBody>
-          <a:bodyPr lIns="91425" tIns="91425" rIns="91425" bIns="91425" anchor="ctr" anchorCtr="0">
-            <a:noAutofit/>
-          </a:bodyPr>
-          <a:lstStyle/>
-          <a:p>
-            <a:pPr marL="457200" lvl="0" indent="-419100" rtl="0">
+              <a:spcBef>
+                <a:spcPts val="600"/>
+              </a:spcBef>
               <a:buClr>
                 <a:schemeClr val="dk1"/>
               </a:buClr>
-              <a:buSzPct val="166666"/>
+              <a:buSzPct val="25000"/>
               <a:buFont typeface="Arial"/>
-              <a:buChar char="•"/>
+              <a:buNone/>
             </a:pPr>
             <a:r>
-              <a:rPr lang="en" dirty="0"/>
-              <a:t>For his awesomeness</a:t>
-            </a:r>
-          </a:p>
-          <a:p>
-            <a:pPr marL="914400" lvl="1" indent="-381000" rtl="0">
-              <a:buClr>
-                <a:schemeClr val="dk1"/>
-              </a:buClr>
-              <a:buSzPct val="80000"/>
-              <a:buFont typeface="Courier New"/>
-              <a:buChar char="o"/>
-            </a:pPr>
-            <a:r>
-              <a:rPr lang="en" dirty="0"/>
-              <a:t>Dr. Ahmed Al Jumaili</a:t>
-            </a:r>
-          </a:p>
-          <a:p>
-            <a:endParaRPr lang="en" dirty="0"/>
-          </a:p>
-          <a:p>
-            <a:pPr marL="457200" lvl="0" indent="-419100" rtl="0">
-              <a:buClr>
-                <a:schemeClr val="dk1"/>
-              </a:buClr>
-              <a:buSzPct val="166666"/>
-              <a:buFont typeface="Arial"/>
-              <a:buChar char="•"/>
-            </a:pPr>
-            <a:r>
-              <a:rPr lang="en" dirty="0"/>
-              <a:t>For mathematics advises</a:t>
-            </a:r>
-          </a:p>
-          <a:p>
-            <a:pPr marL="914400" lvl="1" indent="-381000" rtl="0">
-              <a:buClr>
-                <a:schemeClr val="dk1"/>
-              </a:buClr>
-              <a:buSzPct val="80000"/>
-              <a:buFont typeface="Courier New"/>
-              <a:buChar char="o"/>
-            </a:pPr>
-            <a:r>
-              <a:rPr lang="en" dirty="0"/>
-              <a:t>Bastien G.</a:t>
-            </a:r>
-          </a:p>
-          <a:p>
-            <a:pPr marL="914400" lvl="1" indent="-381000" rtl="0">
-              <a:buClr>
-                <a:schemeClr val="dk1"/>
-              </a:buClr>
-              <a:buSzPct val="80000"/>
-              <a:buFont typeface="Courier New"/>
-              <a:buChar char="o"/>
-            </a:pPr>
-            <a:r>
-              <a:rPr lang="en" dirty="0"/>
-              <a:t>Walid B.</a:t>
-            </a:r>
+              <a:rPr lang="en" sz="7200">
+                <a:solidFill>
+                  <a:srgbClr val="FFFFFF"/>
+                </a:solidFill>
+              </a:rPr>
+              <a:t>Let’s see it in action !</a:t>
+            </a:r>
+          </a:p>
+          <a:p>
+            <a:endParaRPr lang="en" sz="7200">
+              <a:solidFill>
+                <a:srgbClr val="FFFFFF"/>
+              </a:solidFill>
+            </a:endParaRPr>
           </a:p>
         </p:txBody>
       </p:sp>
@@ -10916,6 +11030,175 @@
 </file>
 
 <file path=ppt/slides/slide26.xml><?xml version="1.0" encoding="utf-8"?>
+<p:sld xmlns:a="http://schemas.openxmlformats.org/drawingml/2006/main" xmlns:r="http://schemas.openxmlformats.org/officeDocument/2006/relationships" xmlns:p="http://schemas.openxmlformats.org/presentationml/2006/main">
+  <p:cSld>
+    <p:spTree>
+      <p:nvGrpSpPr>
+        <p:cNvPr id="1" name="Shape 345"/>
+        <p:cNvGrpSpPr/>
+        <p:nvPr/>
+      </p:nvGrpSpPr>
+      <p:grpSpPr>
+        <a:xfrm>
+          <a:off x="0" y="0"/>
+          <a:ext cx="0" cy="0"/>
+          <a:chOff x="0" y="0"/>
+          <a:chExt cx="0" cy="0"/>
+        </a:xfrm>
+      </p:grpSpPr>
+      <p:sp>
+        <p:nvSpPr>
+          <p:cNvPr id="346" name="Shape 346"/>
+          <p:cNvSpPr txBox="1">
+            <a:spLocks noGrp="1"/>
+          </p:cNvSpPr>
+          <p:nvPr>
+            <p:ph type="title"/>
+          </p:nvPr>
+        </p:nvSpPr>
+        <p:spPr>
+          <a:xfrm>
+            <a:off x="457200" y="205978"/>
+            <a:ext cx="8229600" cy="857400"/>
+          </a:xfrm>
+          <a:prstGeom prst="rect">
+            <a:avLst/>
+          </a:prstGeom>
+        </p:spPr>
+        <p:txBody>
+          <a:bodyPr lIns="91425" tIns="91425" rIns="91425" bIns="91425" anchor="ctr" anchorCtr="0">
+            <a:noAutofit/>
+          </a:bodyPr>
+          <a:lstStyle/>
+          <a:p>
+            <a:pPr lvl="0" rtl="0">
+              <a:buNone/>
+            </a:pPr>
+            <a:r>
+              <a:rPr lang="en"/>
+              <a:t>Specials thanks</a:t>
+            </a:r>
+          </a:p>
+        </p:txBody>
+      </p:sp>
+      <p:sp>
+        <p:nvSpPr>
+          <p:cNvPr id="347" name="Shape 347"/>
+          <p:cNvSpPr txBox="1">
+            <a:spLocks noGrp="1"/>
+          </p:cNvSpPr>
+          <p:nvPr>
+            <p:ph type="body" idx="1"/>
+          </p:nvPr>
+        </p:nvSpPr>
+        <p:spPr>
+          <a:xfrm>
+            <a:off x="457200" y="1200150"/>
+            <a:ext cx="8229600" cy="3252300"/>
+          </a:xfrm>
+          <a:prstGeom prst="rect">
+            <a:avLst/>
+          </a:prstGeom>
+        </p:spPr>
+        <p:txBody>
+          <a:bodyPr lIns="91425" tIns="91425" rIns="91425" bIns="91425" anchor="ctr" anchorCtr="0">
+            <a:noAutofit/>
+          </a:bodyPr>
+          <a:lstStyle/>
+          <a:p>
+            <a:pPr marL="457200" lvl="0" indent="-419100" rtl="0">
+              <a:buClr>
+                <a:schemeClr val="dk1"/>
+              </a:buClr>
+              <a:buSzPct val="166666"/>
+              <a:buFont typeface="Arial"/>
+              <a:buChar char="•"/>
+            </a:pPr>
+            <a:r>
+              <a:rPr lang="en" dirty="0"/>
+              <a:t>For his awesomeness</a:t>
+            </a:r>
+          </a:p>
+          <a:p>
+            <a:pPr marL="914400" lvl="1" indent="-381000" rtl="0">
+              <a:buClr>
+                <a:schemeClr val="dk1"/>
+              </a:buClr>
+              <a:buSzPct val="80000"/>
+              <a:buFont typeface="Courier New"/>
+              <a:buChar char="o"/>
+            </a:pPr>
+            <a:r>
+              <a:rPr lang="en" dirty="0"/>
+              <a:t>Dr. Ahmed Al Jumaili</a:t>
+            </a:r>
+          </a:p>
+          <a:p>
+            <a:endParaRPr lang="en" dirty="0"/>
+          </a:p>
+          <a:p>
+            <a:pPr marL="457200" lvl="0" indent="-419100" rtl="0">
+              <a:buClr>
+                <a:schemeClr val="dk1"/>
+              </a:buClr>
+              <a:buSzPct val="166666"/>
+              <a:buFont typeface="Arial"/>
+              <a:buChar char="•"/>
+            </a:pPr>
+            <a:r>
+              <a:rPr lang="en" dirty="0"/>
+              <a:t>For mathematics advises</a:t>
+            </a:r>
+          </a:p>
+          <a:p>
+            <a:pPr marL="914400" lvl="1" indent="-381000" rtl="0">
+              <a:buClr>
+                <a:schemeClr val="dk1"/>
+              </a:buClr>
+              <a:buSzPct val="80000"/>
+              <a:buFont typeface="Courier New"/>
+              <a:buChar char="o"/>
+            </a:pPr>
+            <a:r>
+              <a:rPr lang="en" dirty="0"/>
+              <a:t>Bastien G.</a:t>
+            </a:r>
+          </a:p>
+          <a:p>
+            <a:pPr marL="914400" lvl="1" indent="-381000" rtl="0">
+              <a:buClr>
+                <a:schemeClr val="dk1"/>
+              </a:buClr>
+              <a:buSzPct val="80000"/>
+              <a:buFont typeface="Courier New"/>
+              <a:buChar char="o"/>
+            </a:pPr>
+            <a:r>
+              <a:rPr lang="en" dirty="0"/>
+              <a:t>Walid B.</a:t>
+            </a:r>
+          </a:p>
+        </p:txBody>
+      </p:sp>
+    </p:spTree>
+  </p:cSld>
+  <p:clrMapOvr>
+    <a:masterClrMapping/>
+  </p:clrMapOvr>
+  <p:transition spd="slow">
+    <p:cut/>
+  </p:transition>
+  <p:timing>
+    <p:tnLst>
+      <p:par>
+        <p:cTn id="1" dur="indefinite" restart="never" nodeType="tmRoot"/>
+      </p:par>
+    </p:tnLst>
+  </p:timing>
+</p:sld>
+</file>
+
+<file path=ppt/slides/slide27.xml><?xml version="1.0" encoding="utf-8"?>
 <p:sld xmlns:a="http://schemas.openxmlformats.org/drawingml/2006/main" xmlns:r="http://schemas.openxmlformats.org/officeDocument/2006/relationships" xmlns:p="http://schemas.openxmlformats.org/presentationml/2006/main">
   <p:cSld>
     <p:spTree>
@@ -12302,7 +12585,7 @@
                         <a:buNone/>
                       </a:pPr>
                       <a:r>
-                        <a:rPr lang="en"/>
+                        <a:rPr lang="en" dirty="0"/>
                         <a:t>B</a:t>
                       </a:r>
                     </a:p>
@@ -12342,7 +12625,7 @@
                         <a:buNone/>
                       </a:pPr>
                       <a:r>
-                        <a:rPr lang="en"/>
+                        <a:rPr lang="en" dirty="0"/>
                         <a:t>Your Id is “4”</a:t>
                       </a:r>
                     </a:p>
@@ -12364,7 +12647,7 @@
                         <a:buNone/>
                       </a:pPr>
                       <a:r>
-                        <a:rPr lang="en"/>
+                        <a:rPr lang="en" dirty="0"/>
                         <a:t>B</a:t>
                       </a:r>
                     </a:p>
@@ -12380,7 +12663,7 @@
                         <a:buNone/>
                       </a:pPr>
                       <a:r>
-                        <a:rPr lang="en"/>
+                        <a:rPr lang="en" dirty="0"/>
                         <a:t>A</a:t>
                       </a:r>
                     </a:p>
@@ -12396,7 +12679,7 @@
                         <a:buNone/>
                       </a:pPr>
                       <a:r>
-                        <a:rPr lang="en"/>
+                        <a:rPr lang="en" dirty="0"/>
                         <a:t>I confirm, your id is “4”</a:t>
                       </a:r>
                     </a:p>
@@ -12714,6 +12997,236 @@
           </a:p>
         </p:txBody>
       </p:sp>
+      <p:sp>
+        <p:nvSpPr>
+          <p:cNvPr id="2" name="Rectangle 1"/>
+          <p:cNvSpPr/>
+          <p:nvPr/>
+        </p:nvSpPr>
+        <p:spPr>
+          <a:xfrm>
+            <a:off x="168250" y="2483197"/>
+            <a:ext cx="8236915" cy="411480"/>
+          </a:xfrm>
+          <a:prstGeom prst="rect">
+            <a:avLst/>
+          </a:prstGeom>
+          <a:solidFill>
+            <a:schemeClr val="bg1"/>
+          </a:solidFill>
+          <a:ln>
+            <a:noFill/>
+          </a:ln>
+        </p:spPr>
+        <p:style>
+          <a:lnRef idx="2">
+            <a:schemeClr val="accent1">
+              <a:shade val="50000"/>
+            </a:schemeClr>
+          </a:lnRef>
+          <a:fillRef idx="1">
+            <a:schemeClr val="accent1"/>
+          </a:fillRef>
+          <a:effectRef idx="0">
+            <a:schemeClr val="accent1"/>
+          </a:effectRef>
+          <a:fontRef idx="minor">
+            <a:schemeClr val="lt1"/>
+          </a:fontRef>
+        </p:style>
+        <p:txBody>
+          <a:bodyPr rtlCol="0" anchor="ctr"/>
+          <a:lstStyle/>
+          <a:p>
+            <a:pPr algn="ctr"/>
+            <a:endParaRPr lang="fr-FR"/>
+          </a:p>
+        </p:txBody>
+      </p:sp>
+      <p:sp>
+        <p:nvSpPr>
+          <p:cNvPr id="19" name="Rectangle 18"/>
+          <p:cNvSpPr/>
+          <p:nvPr/>
+        </p:nvSpPr>
+        <p:spPr>
+          <a:xfrm>
+            <a:off x="307950" y="2894677"/>
+            <a:ext cx="8236915" cy="411480"/>
+          </a:xfrm>
+          <a:prstGeom prst="rect">
+            <a:avLst/>
+          </a:prstGeom>
+          <a:solidFill>
+            <a:schemeClr val="bg1"/>
+          </a:solidFill>
+          <a:ln>
+            <a:noFill/>
+          </a:ln>
+        </p:spPr>
+        <p:style>
+          <a:lnRef idx="2">
+            <a:schemeClr val="accent1">
+              <a:shade val="50000"/>
+            </a:schemeClr>
+          </a:lnRef>
+          <a:fillRef idx="1">
+            <a:schemeClr val="accent1"/>
+          </a:fillRef>
+          <a:effectRef idx="0">
+            <a:schemeClr val="accent1"/>
+          </a:effectRef>
+          <a:fontRef idx="minor">
+            <a:schemeClr val="lt1"/>
+          </a:fontRef>
+        </p:style>
+        <p:txBody>
+          <a:bodyPr rtlCol="0" anchor="ctr"/>
+          <a:lstStyle/>
+          <a:p>
+            <a:pPr algn="ctr"/>
+            <a:endParaRPr lang="fr-FR"/>
+          </a:p>
+        </p:txBody>
+      </p:sp>
+      <p:sp>
+        <p:nvSpPr>
+          <p:cNvPr id="20" name="Rectangle 19"/>
+          <p:cNvSpPr/>
+          <p:nvPr/>
+        </p:nvSpPr>
+        <p:spPr>
+          <a:xfrm>
+            <a:off x="307949" y="3300472"/>
+            <a:ext cx="8236915" cy="411480"/>
+          </a:xfrm>
+          <a:prstGeom prst="rect">
+            <a:avLst/>
+          </a:prstGeom>
+          <a:solidFill>
+            <a:schemeClr val="bg1"/>
+          </a:solidFill>
+          <a:ln>
+            <a:noFill/>
+          </a:ln>
+        </p:spPr>
+        <p:style>
+          <a:lnRef idx="2">
+            <a:schemeClr val="accent1">
+              <a:shade val="50000"/>
+            </a:schemeClr>
+          </a:lnRef>
+          <a:fillRef idx="1">
+            <a:schemeClr val="accent1"/>
+          </a:fillRef>
+          <a:effectRef idx="0">
+            <a:schemeClr val="accent1"/>
+          </a:effectRef>
+          <a:fontRef idx="minor">
+            <a:schemeClr val="lt1"/>
+          </a:fontRef>
+        </p:style>
+        <p:txBody>
+          <a:bodyPr rtlCol="0" anchor="ctr"/>
+          <a:lstStyle/>
+          <a:p>
+            <a:pPr algn="ctr"/>
+            <a:endParaRPr lang="fr-FR"/>
+          </a:p>
+        </p:txBody>
+      </p:sp>
+      <p:sp>
+        <p:nvSpPr>
+          <p:cNvPr id="21" name="Rectangle 20"/>
+          <p:cNvSpPr/>
+          <p:nvPr/>
+        </p:nvSpPr>
+        <p:spPr>
+          <a:xfrm>
+            <a:off x="327455" y="3708648"/>
+            <a:ext cx="8236915" cy="411480"/>
+          </a:xfrm>
+          <a:prstGeom prst="rect">
+            <a:avLst/>
+          </a:prstGeom>
+          <a:solidFill>
+            <a:schemeClr val="bg1"/>
+          </a:solidFill>
+          <a:ln>
+            <a:noFill/>
+          </a:ln>
+        </p:spPr>
+        <p:style>
+          <a:lnRef idx="2">
+            <a:schemeClr val="accent1">
+              <a:shade val="50000"/>
+            </a:schemeClr>
+          </a:lnRef>
+          <a:fillRef idx="1">
+            <a:schemeClr val="accent1"/>
+          </a:fillRef>
+          <a:effectRef idx="0">
+            <a:schemeClr val="accent1"/>
+          </a:effectRef>
+          <a:fontRef idx="minor">
+            <a:schemeClr val="lt1"/>
+          </a:fontRef>
+        </p:style>
+        <p:txBody>
+          <a:bodyPr rtlCol="0" anchor="ctr"/>
+          <a:lstStyle/>
+          <a:p>
+            <a:pPr algn="ctr"/>
+            <a:endParaRPr lang="fr-FR"/>
+          </a:p>
+        </p:txBody>
+      </p:sp>
+      <p:sp>
+        <p:nvSpPr>
+          <p:cNvPr id="22" name="Rectangle 21"/>
+          <p:cNvSpPr/>
+          <p:nvPr/>
+        </p:nvSpPr>
+        <p:spPr>
+          <a:xfrm>
+            <a:off x="327455" y="4116824"/>
+            <a:ext cx="8236915" cy="411480"/>
+          </a:xfrm>
+          <a:prstGeom prst="rect">
+            <a:avLst/>
+          </a:prstGeom>
+          <a:solidFill>
+            <a:schemeClr val="bg1"/>
+          </a:solidFill>
+          <a:ln>
+            <a:noFill/>
+          </a:ln>
+        </p:spPr>
+        <p:style>
+          <a:lnRef idx="2">
+            <a:schemeClr val="accent1">
+              <a:shade val="50000"/>
+            </a:schemeClr>
+          </a:lnRef>
+          <a:fillRef idx="1">
+            <a:schemeClr val="accent1"/>
+          </a:fillRef>
+          <a:effectRef idx="0">
+            <a:schemeClr val="accent1"/>
+          </a:effectRef>
+          <a:fontRef idx="minor">
+            <a:schemeClr val="lt1"/>
+          </a:fontRef>
+        </p:style>
+        <p:txBody>
+          <a:bodyPr rtlCol="0" anchor="ctr"/>
+          <a:lstStyle/>
+          <a:p>
+            <a:pPr algn="ctr"/>
+            <a:endParaRPr lang="fr-FR"/>
+          </a:p>
+        </p:txBody>
+      </p:sp>
     </p:spTree>
   </p:cSld>
   <p:clrMapOvr>
@@ -12725,9 +13238,304 @@
   <p:timing>
     <p:tnLst>
       <p:par>
-        <p:cTn id="1" dur="indefinite" restart="never" nodeType="tmRoot"/>
+        <p:cTn id="1" dur="indefinite" restart="never" nodeType="tmRoot">
+          <p:childTnLst>
+            <p:seq concurrent="1" nextAc="seek">
+              <p:cTn id="2" dur="indefinite" nodeType="mainSeq">
+                <p:childTnLst>
+                  <p:par>
+                    <p:cTn id="3" fill="hold">
+                      <p:stCondLst>
+                        <p:cond delay="indefinite"/>
+                      </p:stCondLst>
+                      <p:childTnLst>
+                        <p:par>
+                          <p:cTn id="4" fill="hold">
+                            <p:stCondLst>
+                              <p:cond delay="0"/>
+                            </p:stCondLst>
+                            <p:childTnLst>
+                              <p:par>
+                                <p:cTn id="5" presetID="10" presetClass="exit" presetSubtype="0" fill="hold" grpId="0" nodeType="clickEffect">
+                                  <p:stCondLst>
+                                    <p:cond delay="0"/>
+                                  </p:stCondLst>
+                                  <p:childTnLst>
+                                    <p:animEffect transition="out" filter="fade">
+                                      <p:cBhvr>
+                                        <p:cTn id="6" dur="500"/>
+                                        <p:tgtEl>
+                                          <p:spTgt spid="2"/>
+                                        </p:tgtEl>
+                                      </p:cBhvr>
+                                    </p:animEffect>
+                                    <p:set>
+                                      <p:cBhvr>
+                                        <p:cTn id="7" dur="1" fill="hold">
+                                          <p:stCondLst>
+                                            <p:cond delay="499"/>
+                                          </p:stCondLst>
+                                        </p:cTn>
+                                        <p:tgtEl>
+                                          <p:spTgt spid="2"/>
+                                        </p:tgtEl>
+                                        <p:attrNameLst>
+                                          <p:attrName>style.visibility</p:attrName>
+                                        </p:attrNameLst>
+                                      </p:cBhvr>
+                                      <p:to>
+                                        <p:strVal val="hidden"/>
+                                      </p:to>
+                                    </p:set>
+                                  </p:childTnLst>
+                                </p:cTn>
+                              </p:par>
+                            </p:childTnLst>
+                          </p:cTn>
+                        </p:par>
+                      </p:childTnLst>
+                    </p:cTn>
+                  </p:par>
+                  <p:par>
+                    <p:cTn id="8" fill="hold">
+                      <p:stCondLst>
+                        <p:cond delay="indefinite"/>
+                      </p:stCondLst>
+                      <p:childTnLst>
+                        <p:par>
+                          <p:cTn id="9" fill="hold">
+                            <p:stCondLst>
+                              <p:cond delay="0"/>
+                            </p:stCondLst>
+                            <p:childTnLst>
+                              <p:par>
+                                <p:cTn id="10" presetID="10" presetClass="exit" presetSubtype="0" fill="hold" grpId="0" nodeType="clickEffect">
+                                  <p:stCondLst>
+                                    <p:cond delay="0"/>
+                                  </p:stCondLst>
+                                  <p:childTnLst>
+                                    <p:animEffect transition="out" filter="fade">
+                                      <p:cBhvr>
+                                        <p:cTn id="11" dur="500"/>
+                                        <p:tgtEl>
+                                          <p:spTgt spid="19"/>
+                                        </p:tgtEl>
+                                      </p:cBhvr>
+                                    </p:animEffect>
+                                    <p:set>
+                                      <p:cBhvr>
+                                        <p:cTn id="12" dur="1" fill="hold">
+                                          <p:stCondLst>
+                                            <p:cond delay="499"/>
+                                          </p:stCondLst>
+                                        </p:cTn>
+                                        <p:tgtEl>
+                                          <p:spTgt spid="19"/>
+                                        </p:tgtEl>
+                                        <p:attrNameLst>
+                                          <p:attrName>style.visibility</p:attrName>
+                                        </p:attrNameLst>
+                                      </p:cBhvr>
+                                      <p:to>
+                                        <p:strVal val="hidden"/>
+                                      </p:to>
+                                    </p:set>
+                                  </p:childTnLst>
+                                </p:cTn>
+                              </p:par>
+                            </p:childTnLst>
+                          </p:cTn>
+                        </p:par>
+                      </p:childTnLst>
+                    </p:cTn>
+                  </p:par>
+                  <p:par>
+                    <p:cTn id="13" fill="hold">
+                      <p:stCondLst>
+                        <p:cond delay="indefinite"/>
+                      </p:stCondLst>
+                      <p:childTnLst>
+                        <p:par>
+                          <p:cTn id="14" fill="hold">
+                            <p:stCondLst>
+                              <p:cond delay="0"/>
+                            </p:stCondLst>
+                            <p:childTnLst>
+                              <p:par>
+                                <p:cTn id="15" presetID="10" presetClass="exit" presetSubtype="0" fill="hold" grpId="0" nodeType="clickEffect">
+                                  <p:stCondLst>
+                                    <p:cond delay="0"/>
+                                  </p:stCondLst>
+                                  <p:childTnLst>
+                                    <p:animEffect transition="out" filter="fade">
+                                      <p:cBhvr>
+                                        <p:cTn id="16" dur="500"/>
+                                        <p:tgtEl>
+                                          <p:spTgt spid="20"/>
+                                        </p:tgtEl>
+                                      </p:cBhvr>
+                                    </p:animEffect>
+                                    <p:set>
+                                      <p:cBhvr>
+                                        <p:cTn id="17" dur="1" fill="hold">
+                                          <p:stCondLst>
+                                            <p:cond delay="499"/>
+                                          </p:stCondLst>
+                                        </p:cTn>
+                                        <p:tgtEl>
+                                          <p:spTgt spid="20"/>
+                                        </p:tgtEl>
+                                        <p:attrNameLst>
+                                          <p:attrName>style.visibility</p:attrName>
+                                        </p:attrNameLst>
+                                      </p:cBhvr>
+                                      <p:to>
+                                        <p:strVal val="hidden"/>
+                                      </p:to>
+                                    </p:set>
+                                  </p:childTnLst>
+                                </p:cTn>
+                              </p:par>
+                            </p:childTnLst>
+                          </p:cTn>
+                        </p:par>
+                      </p:childTnLst>
+                    </p:cTn>
+                  </p:par>
+                  <p:par>
+                    <p:cTn id="18" fill="hold">
+                      <p:stCondLst>
+                        <p:cond delay="indefinite"/>
+                      </p:stCondLst>
+                      <p:childTnLst>
+                        <p:par>
+                          <p:cTn id="19" fill="hold">
+                            <p:stCondLst>
+                              <p:cond delay="0"/>
+                            </p:stCondLst>
+                            <p:childTnLst>
+                              <p:par>
+                                <p:cTn id="20" presetID="10" presetClass="exit" presetSubtype="0" fill="hold" grpId="0" nodeType="clickEffect">
+                                  <p:stCondLst>
+                                    <p:cond delay="0"/>
+                                  </p:stCondLst>
+                                  <p:childTnLst>
+                                    <p:animEffect transition="out" filter="fade">
+                                      <p:cBhvr>
+                                        <p:cTn id="21" dur="500"/>
+                                        <p:tgtEl>
+                                          <p:spTgt spid="21"/>
+                                        </p:tgtEl>
+                                      </p:cBhvr>
+                                    </p:animEffect>
+                                    <p:set>
+                                      <p:cBhvr>
+                                        <p:cTn id="22" dur="1" fill="hold">
+                                          <p:stCondLst>
+                                            <p:cond delay="499"/>
+                                          </p:stCondLst>
+                                        </p:cTn>
+                                        <p:tgtEl>
+                                          <p:spTgt spid="21"/>
+                                        </p:tgtEl>
+                                        <p:attrNameLst>
+                                          <p:attrName>style.visibility</p:attrName>
+                                        </p:attrNameLst>
+                                      </p:cBhvr>
+                                      <p:to>
+                                        <p:strVal val="hidden"/>
+                                      </p:to>
+                                    </p:set>
+                                  </p:childTnLst>
+                                </p:cTn>
+                              </p:par>
+                            </p:childTnLst>
+                          </p:cTn>
+                        </p:par>
+                      </p:childTnLst>
+                    </p:cTn>
+                  </p:par>
+                  <p:par>
+                    <p:cTn id="23" fill="hold">
+                      <p:stCondLst>
+                        <p:cond delay="indefinite"/>
+                      </p:stCondLst>
+                      <p:childTnLst>
+                        <p:par>
+                          <p:cTn id="24" fill="hold">
+                            <p:stCondLst>
+                              <p:cond delay="0"/>
+                            </p:stCondLst>
+                            <p:childTnLst>
+                              <p:par>
+                                <p:cTn id="25" presetID="10" presetClass="exit" presetSubtype="0" fill="hold" grpId="0" nodeType="clickEffect">
+                                  <p:stCondLst>
+                                    <p:cond delay="0"/>
+                                  </p:stCondLst>
+                                  <p:childTnLst>
+                                    <p:animEffect transition="out" filter="fade">
+                                      <p:cBhvr>
+                                        <p:cTn id="26" dur="500"/>
+                                        <p:tgtEl>
+                                          <p:spTgt spid="22"/>
+                                        </p:tgtEl>
+                                      </p:cBhvr>
+                                    </p:animEffect>
+                                    <p:set>
+                                      <p:cBhvr>
+                                        <p:cTn id="27" dur="1" fill="hold">
+                                          <p:stCondLst>
+                                            <p:cond delay="499"/>
+                                          </p:stCondLst>
+                                        </p:cTn>
+                                        <p:tgtEl>
+                                          <p:spTgt spid="22"/>
+                                        </p:tgtEl>
+                                        <p:attrNameLst>
+                                          <p:attrName>style.visibility</p:attrName>
+                                        </p:attrNameLst>
+                                      </p:cBhvr>
+                                      <p:to>
+                                        <p:strVal val="hidden"/>
+                                      </p:to>
+                                    </p:set>
+                                  </p:childTnLst>
+                                </p:cTn>
+                              </p:par>
+                            </p:childTnLst>
+                          </p:cTn>
+                        </p:par>
+                      </p:childTnLst>
+                    </p:cTn>
+                  </p:par>
+                </p:childTnLst>
+              </p:cTn>
+              <p:prevCondLst>
+                <p:cond evt="onPrev" delay="0">
+                  <p:tgtEl>
+                    <p:sldTgt/>
+                  </p:tgtEl>
+                </p:cond>
+              </p:prevCondLst>
+              <p:nextCondLst>
+                <p:cond evt="onNext" delay="0">
+                  <p:tgtEl>
+                    <p:sldTgt/>
+                  </p:tgtEl>
+                </p:cond>
+              </p:nextCondLst>
+            </p:seq>
+          </p:childTnLst>
+        </p:cTn>
       </p:par>
     </p:tnLst>
+    <p:bldLst>
+      <p:bldP spid="2" grpId="0" animBg="1"/>
+      <p:bldP spid="19" grpId="0" animBg="1"/>
+      <p:bldP spid="20" grpId="0" animBg="1"/>
+      <p:bldP spid="21" grpId="0" animBg="1"/>
+      <p:bldP spid="22" grpId="0" animBg="1"/>
+    </p:bldLst>
   </p:timing>
 </p:sld>
 </file>

</xml_diff>